<commit_message>
review 2 ppt updated
</commit_message>
<xml_diff>
--- a/Documents/REVIEW - 2 - UE17CS490B – Capstone Project Phase – 2.pptx
+++ b/Documents/REVIEW - 2 - UE17CS490B – Capstone Project Phase – 2.pptx
@@ -26,11 +26,11 @@
     <p:sldId id="591" r:id="rId14"/>
     <p:sldId id="597" r:id="rId15"/>
     <p:sldId id="592" r:id="rId16"/>
-    <p:sldId id="593" r:id="rId17"/>
-    <p:sldId id="595" r:id="rId18"/>
-    <p:sldId id="596" r:id="rId19"/>
-    <p:sldId id="594" r:id="rId20"/>
-    <p:sldId id="575" r:id="rId21"/>
+    <p:sldId id="599" r:id="rId17"/>
+    <p:sldId id="593" r:id="rId18"/>
+    <p:sldId id="595" r:id="rId19"/>
+    <p:sldId id="596" r:id="rId20"/>
+    <p:sldId id="594" r:id="rId21"/>
     <p:sldId id="573" r:id="rId22"/>
     <p:sldId id="574" r:id="rId23"/>
     <p:sldId id="580" r:id="rId24"/>
@@ -1537,6 +1537,103 @@
     <p:extLst>
       <p:ext uri="{BB962C8B-B14F-4D97-AF65-F5344CB8AC3E}">
         <p14:creationId xmlns:p14="http://schemas.microsoft.com/office/powerpoint/2010/main" val="3614568351"/>
+      </p:ext>
+    </p:extLst>
+  </p:cSld>
+  <p:clrMapOvr>
+    <a:masterClrMapping/>
+  </p:clrMapOvr>
+</p:notes>
+</file>
+
+<file path=ppt/notesSlides/notesSlide9.xml><?xml version="1.0" encoding="utf-8"?>
+<p:notes xmlns:a="http://schemas.openxmlformats.org/drawingml/2006/main" xmlns:r="http://schemas.openxmlformats.org/officeDocument/2006/relationships" xmlns:p="http://schemas.openxmlformats.org/presentationml/2006/main">
+  <p:cSld>
+    <p:spTree>
+      <p:nvGrpSpPr>
+        <p:cNvPr id="1" name=""/>
+        <p:cNvGrpSpPr/>
+        <p:nvPr/>
+      </p:nvGrpSpPr>
+      <p:grpSpPr>
+        <a:xfrm>
+          <a:off x="0" y="0"/>
+          <a:ext cx="0" cy="0"/>
+          <a:chOff x="0" y="0"/>
+          <a:chExt cx="0" cy="0"/>
+        </a:xfrm>
+      </p:grpSpPr>
+      <p:sp>
+        <p:nvSpPr>
+          <p:cNvPr id="2" name="Slide Image Placeholder 1"/>
+          <p:cNvSpPr>
+            <a:spLocks noGrp="1" noRot="1" noChangeAspect="1"/>
+          </p:cNvSpPr>
+          <p:nvPr>
+            <p:ph type="sldImg"/>
+          </p:nvPr>
+        </p:nvSpPr>
+        <p:spPr>
+          <a:xfrm>
+            <a:off x="407988" y="696913"/>
+            <a:ext cx="6196012" cy="3486150"/>
+          </a:xfrm>
+        </p:spPr>
+      </p:sp>
+      <p:sp>
+        <p:nvSpPr>
+          <p:cNvPr id="3" name="Notes Placeholder 2"/>
+          <p:cNvSpPr>
+            <a:spLocks noGrp="1"/>
+          </p:cNvSpPr>
+          <p:nvPr>
+            <p:ph type="body" idx="1"/>
+          </p:nvPr>
+        </p:nvSpPr>
+        <p:spPr/>
+        <p:txBody>
+          <a:bodyPr>
+            <a:normAutofit/>
+          </a:bodyPr>
+          <a:lstStyle/>
+          <a:p>
+            <a:endParaRPr lang="en-US"/>
+          </a:p>
+        </p:txBody>
+      </p:sp>
+      <p:sp>
+        <p:nvSpPr>
+          <p:cNvPr id="4" name="Slide Number Placeholder 3"/>
+          <p:cNvSpPr>
+            <a:spLocks noGrp="1"/>
+          </p:cNvSpPr>
+          <p:nvPr>
+            <p:ph type="sldNum" sz="quarter" idx="10"/>
+          </p:nvPr>
+        </p:nvSpPr>
+        <p:spPr/>
+        <p:txBody>
+          <a:bodyPr/>
+          <a:lstStyle/>
+          <a:p>
+            <a:pPr>
+              <a:defRPr/>
+            </a:pPr>
+            <a:fld id="{01C81575-24DE-4F6C-A73E-0331B3B2E418}" type="slidenum">
+              <a:rPr lang="en-US" smtClean="0"/>
+              <a:pPr>
+                <a:defRPr/>
+              </a:pPr>
+              <a:t>16</a:t>
+            </a:fld>
+            <a:endParaRPr lang="en-US"/>
+          </a:p>
+        </p:txBody>
+      </p:sp>
+    </p:spTree>
+    <p:extLst>
+      <p:ext uri="{BB962C8B-B14F-4D97-AF65-F5344CB8AC3E}">
+        <p14:creationId xmlns:p14="http://schemas.microsoft.com/office/powerpoint/2010/main" val="2916507836"/>
       </p:ext>
     </p:extLst>
   </p:cSld>
@@ -5198,7 +5295,7 @@
         <p:spPr>
           <a:xfrm>
             <a:off x="5219678" y="4500265"/>
-            <a:ext cx="2128463" cy="475512"/>
+            <a:ext cx="2128463" cy="369332"/>
           </a:xfrm>
           <a:prstGeom prst="rect">
             <a:avLst/>
@@ -5212,15 +5309,15 @@
           <a:lstStyle/>
           <a:p>
             <a:r>
-              <a:rPr lang="en-US" sz="2400" dirty="0">
-                <a:solidFill>
-                  <a:srgbClr val="0033CC"/>
-                </a:solidFill>
-                <a:latin typeface="Trebuchet MS"/>
-              </a:rPr>
-              <a:t>Style 2</a:t>
-            </a:r>
-            <a:endParaRPr lang="en-IN" sz="2400" dirty="0">
+              <a:rPr lang="en-US" dirty="0">
+                <a:solidFill>
+                  <a:srgbClr val="0033CC"/>
+                </a:solidFill>
+                <a:latin typeface="Trebuchet MS"/>
+              </a:rPr>
+              <a:t>Style 2 - Locomo</a:t>
+            </a:r>
+            <a:endParaRPr lang="en-IN" dirty="0">
               <a:solidFill>
                 <a:srgbClr val="0033CC"/>
               </a:solidFill>
@@ -5244,7 +5341,7 @@
         <p:spPr>
           <a:xfrm>
             <a:off x="5200348" y="2133600"/>
-            <a:ext cx="2128463" cy="475512"/>
+            <a:ext cx="2128463" cy="369332"/>
           </a:xfrm>
           <a:prstGeom prst="rect">
             <a:avLst/>
@@ -5258,15 +5355,15 @@
           <a:lstStyle/>
           <a:p>
             <a:r>
-              <a:rPr lang="en-US" sz="2400" dirty="0">
-                <a:solidFill>
-                  <a:srgbClr val="0033CC"/>
-                </a:solidFill>
-                <a:latin typeface="Trebuchet MS"/>
-              </a:rPr>
-              <a:t>Style 1 </a:t>
-            </a:r>
-            <a:endParaRPr lang="en-IN" sz="2400" dirty="0">
+              <a:rPr lang="en-US" dirty="0">
+                <a:solidFill>
+                  <a:srgbClr val="0033CC"/>
+                </a:solidFill>
+                <a:latin typeface="Trebuchet MS"/>
+              </a:rPr>
+              <a:t>Style 1 - Zina  </a:t>
+            </a:r>
+            <a:endParaRPr lang="en-IN" dirty="0">
               <a:solidFill>
                 <a:srgbClr val="0033CC"/>
               </a:solidFill>
@@ -6323,7 +6420,52 @@
                 </a:solidFill>
                 <a:latin typeface="Trebuchet MS"/>
               </a:rPr>
-              <a:t>The results of the model improve on increasing the image size</a:t>
+              <a:t>The results of the </a:t>
+            </a:r>
+            <a:r>
+              <a:rPr lang="en-US" sz="2400" b="1" dirty="0">
+                <a:solidFill>
+                  <a:srgbClr val="0033CC"/>
+                </a:solidFill>
+                <a:latin typeface="Trebuchet MS"/>
+              </a:rPr>
+              <a:t>model improve </a:t>
+            </a:r>
+            <a:r>
+              <a:rPr lang="en-US" sz="2400" dirty="0">
+                <a:solidFill>
+                  <a:srgbClr val="0033CC"/>
+                </a:solidFill>
+                <a:latin typeface="Trebuchet MS"/>
+              </a:rPr>
+              <a:t>on </a:t>
+            </a:r>
+            <a:r>
+              <a:rPr lang="en-US" sz="2400" b="1" dirty="0">
+                <a:solidFill>
+                  <a:srgbClr val="0033CC"/>
+                </a:solidFill>
+                <a:latin typeface="Trebuchet MS"/>
+              </a:rPr>
+              <a:t>increasing</a:t>
+            </a:r>
+            <a:r>
+              <a:rPr lang="en-US" sz="2400" dirty="0">
+                <a:solidFill>
+                  <a:srgbClr val="0033CC"/>
+                </a:solidFill>
+                <a:latin typeface="Trebuchet MS"/>
+              </a:rPr>
+              <a:t> the </a:t>
+            </a:r>
+            <a:r>
+              <a:rPr lang="en-US" sz="2400" b="1" dirty="0">
+                <a:solidFill>
+                  <a:srgbClr val="0033CC"/>
+                </a:solidFill>
+                <a:latin typeface="Trebuchet MS"/>
+              </a:rPr>
+              <a:t>image size</a:t>
             </a:r>
           </a:p>
           <a:p>
@@ -6332,7 +6474,7 @@
               <a:buChar char="•"/>
             </a:pPr>
             <a:r>
-              <a:rPr lang="en-US" sz="2400" dirty="0">
+              <a:rPr lang="en-US" sz="2400" b="1" dirty="0">
                 <a:solidFill>
                   <a:srgbClr val="0033CC"/>
                 </a:solidFill>
@@ -6442,7 +6584,25 @@
                 </a:solidFill>
                 <a:latin typeface="Trebuchet MS"/>
               </a:rPr>
-              <a:t>Although the results of the model improve on increasing the image size, the generation time increases significantly.</a:t>
+              <a:t>Although the results of the model improve on increasing the image size, the </a:t>
+            </a:r>
+            <a:r>
+              <a:rPr lang="en-US" sz="2400" b="1" dirty="0">
+                <a:solidFill>
+                  <a:srgbClr val="0033CC"/>
+                </a:solidFill>
+                <a:latin typeface="Trebuchet MS"/>
+              </a:rPr>
+              <a:t>generation time increases significantly</a:t>
+            </a:r>
+            <a:r>
+              <a:rPr lang="en-US" sz="2400" dirty="0">
+                <a:solidFill>
+                  <a:srgbClr val="0033CC"/>
+                </a:solidFill>
+                <a:latin typeface="Trebuchet MS"/>
+              </a:rPr>
+              <a:t>.</a:t>
             </a:r>
           </a:p>
           <a:p>
@@ -6457,7 +6617,25 @@
                 </a:solidFill>
                 <a:latin typeface="Trebuchet MS"/>
               </a:rPr>
-              <a:t>The model outputs saturate after a few thousand iterations.</a:t>
+              <a:t>The model </a:t>
+            </a:r>
+            <a:r>
+              <a:rPr lang="en-US" sz="2400" b="1" dirty="0">
+                <a:solidFill>
+                  <a:srgbClr val="0033CC"/>
+                </a:solidFill>
+                <a:latin typeface="Trebuchet MS"/>
+              </a:rPr>
+              <a:t>outputs saturate </a:t>
+            </a:r>
+            <a:r>
+              <a:rPr lang="en-US" sz="2400" dirty="0">
+                <a:solidFill>
+                  <a:srgbClr val="0033CC"/>
+                </a:solidFill>
+                <a:latin typeface="Trebuchet MS"/>
+              </a:rPr>
+              <a:t>after a few thousand iterations.</a:t>
             </a:r>
           </a:p>
           <a:p>
@@ -6472,7 +6650,43 @@
                 </a:solidFill>
                 <a:latin typeface="Trebuchet MS"/>
               </a:rPr>
-              <a:t>Each letter needs to be iteratively generated(1000).</a:t>
+              <a:t>Each </a:t>
+            </a:r>
+            <a:r>
+              <a:rPr lang="en-US" sz="2400" b="1" dirty="0">
+                <a:solidFill>
+                  <a:srgbClr val="0033CC"/>
+                </a:solidFill>
+                <a:latin typeface="Trebuchet MS"/>
+              </a:rPr>
+              <a:t>letter</a:t>
+            </a:r>
+            <a:r>
+              <a:rPr lang="en-US" sz="2400" dirty="0">
+                <a:solidFill>
+                  <a:srgbClr val="0033CC"/>
+                </a:solidFill>
+                <a:latin typeface="Trebuchet MS"/>
+              </a:rPr>
+              <a:t> needs to be </a:t>
+            </a:r>
+            <a:r>
+              <a:rPr lang="en-US" sz="2400" b="1" dirty="0">
+                <a:solidFill>
+                  <a:srgbClr val="0033CC"/>
+                </a:solidFill>
+                <a:latin typeface="Trebuchet MS"/>
+              </a:rPr>
+              <a:t>iteratively generated</a:t>
+            </a:r>
+            <a:r>
+              <a:rPr lang="en-US" sz="2400" dirty="0">
+                <a:solidFill>
+                  <a:srgbClr val="0033CC"/>
+                </a:solidFill>
+                <a:latin typeface="Trebuchet MS"/>
+              </a:rPr>
+              <a:t>(1000).</a:t>
             </a:r>
           </a:p>
           <a:p>
@@ -7437,244 +7651,223 @@
           </a:p>
         </p:txBody>
       </p:sp>
-      <p:grpSp>
-        <p:nvGrpSpPr>
-          <p:cNvPr id="2" name="Group 1">
+      <p:pic>
+        <p:nvPicPr>
+          <p:cNvPr id="3" name="Picture 2">
             <a:extLst>
               <a:ext uri="{FF2B5EF4-FFF2-40B4-BE49-F238E27FC236}">
-                <a16:creationId xmlns:a16="http://schemas.microsoft.com/office/drawing/2014/main" id="{82BF3954-C280-4A30-B2F9-01D082A67E34}"/>
+                <a16:creationId xmlns:a16="http://schemas.microsoft.com/office/drawing/2014/main" id="{394F7536-82F2-4706-AB02-36ADAF95C3CA}"/>
               </a:ext>
             </a:extLst>
           </p:cNvPr>
-          <p:cNvGrpSpPr/>
+          <p:cNvPicPr>
+            <a:picLocks noChangeAspect="1"/>
+          </p:cNvPicPr>
           <p:nvPr/>
-        </p:nvGrpSpPr>
-        <p:grpSpPr>
+        </p:nvPicPr>
+        <p:blipFill rotWithShape="1">
+          <a:blip r:embed="rId3">
+            <a:extLst>
+              <a:ext uri="{28A0092B-C50C-407E-A947-70E740481C1C}">
+                <a14:useLocalDpi xmlns:a14="http://schemas.microsoft.com/office/drawing/2010/main" val="0"/>
+              </a:ext>
+            </a:extLst>
+          </a:blip>
+          <a:srcRect l="15605" t="18013" r="19897" b="33502"/>
+          <a:stretch/>
+        </p:blipFill>
+        <p:spPr>
           <a:xfrm>
-            <a:off x="304800" y="2897751"/>
-            <a:ext cx="11622656" cy="2538953"/>
-            <a:chOff x="304800" y="2897751"/>
-            <a:chExt cx="11622656" cy="2538953"/>
+            <a:off x="2307033" y="2897751"/>
+            <a:ext cx="7577933" cy="2538953"/>
           </a:xfrm>
-        </p:grpSpPr>
-        <p:pic>
-          <p:nvPicPr>
-            <p:cNvPr id="3" name="Picture 2">
-              <a:extLst>
-                <a:ext uri="{FF2B5EF4-FFF2-40B4-BE49-F238E27FC236}">
-                  <a16:creationId xmlns:a16="http://schemas.microsoft.com/office/drawing/2014/main" id="{394F7536-82F2-4706-AB02-36ADAF95C3CA}"/>
-                </a:ext>
-              </a:extLst>
-            </p:cNvPr>
-            <p:cNvPicPr>
-              <a:picLocks noChangeAspect="1"/>
-            </p:cNvPicPr>
-            <p:nvPr/>
-          </p:nvPicPr>
-          <p:blipFill rotWithShape="1">
-            <a:blip r:embed="rId3">
-              <a:extLst>
-                <a:ext uri="{28A0092B-C50C-407E-A947-70E740481C1C}">
-                  <a14:useLocalDpi xmlns:a14="http://schemas.microsoft.com/office/drawing/2010/main" val="0"/>
-                </a:ext>
-              </a:extLst>
-            </a:blip>
-            <a:srcRect l="15605" t="18013" r="19897" b="33502"/>
-            <a:stretch/>
-          </p:blipFill>
-          <p:spPr>
-            <a:xfrm>
-              <a:off x="2307033" y="2897751"/>
-              <a:ext cx="7577933" cy="2538953"/>
-            </a:xfrm>
-            <a:prstGeom prst="rect">
-              <a:avLst/>
-            </a:prstGeom>
-          </p:spPr>
-        </p:pic>
-        <p:pic>
-          <p:nvPicPr>
-            <p:cNvPr id="9" name="Picture 8" descr="A picture containing text, dark, night sky&#10;&#10;Description automatically generated">
-              <a:extLst>
-                <a:ext uri="{FF2B5EF4-FFF2-40B4-BE49-F238E27FC236}">
-                  <a16:creationId xmlns:a16="http://schemas.microsoft.com/office/drawing/2014/main" id="{EC5CC9E4-71C9-4AF9-991D-191F43B52E10}"/>
-                </a:ext>
-              </a:extLst>
-            </p:cNvPr>
-            <p:cNvPicPr>
-              <a:picLocks noChangeAspect="1"/>
-            </p:cNvPicPr>
-            <p:nvPr/>
-          </p:nvPicPr>
-          <p:blipFill>
-            <a:blip r:embed="rId4">
-              <a:extLst>
-                <a:ext uri="{28A0092B-C50C-407E-A947-70E740481C1C}">
-                  <a14:useLocalDpi xmlns:a14="http://schemas.microsoft.com/office/drawing/2010/main" val="0"/>
-                </a:ext>
-              </a:extLst>
-            </a:blip>
-            <a:stretch>
-              <a:fillRect/>
-            </a:stretch>
-          </p:blipFill>
-          <p:spPr>
-            <a:xfrm>
-              <a:off x="304800" y="3574943"/>
-              <a:ext cx="1718467" cy="1718467"/>
-            </a:xfrm>
-            <a:prstGeom prst="rect">
-              <a:avLst/>
-            </a:prstGeom>
-            <a:ln>
-              <a:solidFill>
-                <a:schemeClr val="tx1"/>
-              </a:solidFill>
-            </a:ln>
-          </p:spPr>
-        </p:pic>
-        <p:pic>
-          <p:nvPicPr>
-            <p:cNvPr id="12" name="Picture 11" descr="A picture containing dark, night sky&#10;&#10;Description automatically generated">
-              <a:extLst>
-                <a:ext uri="{FF2B5EF4-FFF2-40B4-BE49-F238E27FC236}">
-                  <a16:creationId xmlns:a16="http://schemas.microsoft.com/office/drawing/2014/main" id="{CA2EA6A4-45D1-4E86-A5F5-5FF77B40D278}"/>
-                </a:ext>
-              </a:extLst>
-            </p:cNvPr>
-            <p:cNvPicPr>
-              <a:picLocks noChangeAspect="1"/>
-            </p:cNvPicPr>
-            <p:nvPr/>
-          </p:nvPicPr>
-          <p:blipFill>
-            <a:blip r:embed="rId5">
-              <a:extLst>
-                <a:ext uri="{28A0092B-C50C-407E-A947-70E740481C1C}">
-                  <a14:useLocalDpi xmlns:a14="http://schemas.microsoft.com/office/drawing/2010/main" val="0"/>
-                </a:ext>
-              </a:extLst>
-            </a:blip>
-            <a:stretch>
-              <a:fillRect/>
-            </a:stretch>
-          </p:blipFill>
-          <p:spPr>
-            <a:xfrm>
-              <a:off x="10205175" y="3571129"/>
-              <a:ext cx="1722281" cy="1722281"/>
-            </a:xfrm>
-            <a:prstGeom prst="rect">
-              <a:avLst/>
-            </a:prstGeom>
-            <a:ln>
-              <a:solidFill>
-                <a:schemeClr val="tx1"/>
-              </a:solidFill>
-            </a:ln>
-          </p:spPr>
-        </p:pic>
-        <p:sp>
-          <p:nvSpPr>
-            <p:cNvPr id="17" name="Arrow: Right 16">
-              <a:extLst>
-                <a:ext uri="{FF2B5EF4-FFF2-40B4-BE49-F238E27FC236}">
-                  <a16:creationId xmlns:a16="http://schemas.microsoft.com/office/drawing/2014/main" id="{F4EFD024-0C75-483A-B7D0-065E5584D420}"/>
-                </a:ext>
-              </a:extLst>
-            </p:cNvPr>
-            <p:cNvSpPr/>
-            <p:nvPr/>
-          </p:nvSpPr>
-          <p:spPr>
-            <a:xfrm>
-              <a:off x="2023267" y="4343400"/>
-              <a:ext cx="320209" cy="76200"/>
-            </a:xfrm>
-            <a:prstGeom prst="rightArrow">
-              <a:avLst/>
-            </a:prstGeom>
-          </p:spPr>
-          <p:style>
-            <a:lnRef idx="2">
-              <a:schemeClr val="accent1">
-                <a:shade val="50000"/>
-              </a:schemeClr>
-            </a:lnRef>
-            <a:fillRef idx="1">
-              <a:schemeClr val="accent1"/>
-            </a:fillRef>
-            <a:effectRef idx="0">
-              <a:schemeClr val="accent1"/>
-            </a:effectRef>
-            <a:fontRef idx="minor">
-              <a:schemeClr val="lt1"/>
-            </a:fontRef>
-          </p:style>
-          <p:txBody>
-            <a:bodyPr rtlCol="0" anchor="ctr"/>
-            <a:lstStyle/>
-            <a:p>
-              <a:pPr algn="ctr"/>
-              <a:endParaRPr lang="en-IN"/>
-            </a:p>
-          </p:txBody>
-        </p:sp>
-        <p:sp>
-          <p:nvSpPr>
-            <p:cNvPr id="28" name="Arrow: Right 27">
-              <a:extLst>
-                <a:ext uri="{FF2B5EF4-FFF2-40B4-BE49-F238E27FC236}">
-                  <a16:creationId xmlns:a16="http://schemas.microsoft.com/office/drawing/2014/main" id="{34C8304A-9B8E-4837-82B8-1263DA122D2C}"/>
-                </a:ext>
-              </a:extLst>
-            </p:cNvPr>
-            <p:cNvSpPr/>
-            <p:nvPr/>
-          </p:nvSpPr>
-          <p:spPr>
-            <a:xfrm>
-              <a:off x="9808689" y="4343400"/>
-              <a:ext cx="396486" cy="76200"/>
-            </a:xfrm>
-            <a:prstGeom prst="rightArrow">
-              <a:avLst/>
-            </a:prstGeom>
+          <a:prstGeom prst="rect">
+            <a:avLst/>
+          </a:prstGeom>
+        </p:spPr>
+      </p:pic>
+      <p:sp>
+        <p:nvSpPr>
+          <p:cNvPr id="17" name="Arrow: Right 16">
+            <a:extLst>
+              <a:ext uri="{FF2B5EF4-FFF2-40B4-BE49-F238E27FC236}">
+                <a16:creationId xmlns:a16="http://schemas.microsoft.com/office/drawing/2014/main" id="{F4EFD024-0C75-483A-B7D0-065E5584D420}"/>
+              </a:ext>
+            </a:extLst>
+          </p:cNvPr>
+          <p:cNvSpPr/>
+          <p:nvPr/>
+        </p:nvSpPr>
+        <p:spPr>
+          <a:xfrm>
+            <a:off x="2023267" y="4343400"/>
+            <a:ext cx="320209" cy="76200"/>
+          </a:xfrm>
+          <a:prstGeom prst="rightArrow">
+            <a:avLst/>
+          </a:prstGeom>
+        </p:spPr>
+        <p:style>
+          <a:lnRef idx="2">
+            <a:schemeClr val="accent1">
+              <a:shade val="50000"/>
+            </a:schemeClr>
+          </a:lnRef>
+          <a:fillRef idx="1">
+            <a:schemeClr val="accent1"/>
+          </a:fillRef>
+          <a:effectRef idx="0">
+            <a:schemeClr val="accent1"/>
+          </a:effectRef>
+          <a:fontRef idx="minor">
+            <a:schemeClr val="lt1"/>
+          </a:fontRef>
+        </p:style>
+        <p:txBody>
+          <a:bodyPr rtlCol="0" anchor="ctr"/>
+          <a:lstStyle/>
+          <a:p>
+            <a:pPr algn="ctr"/>
+            <a:endParaRPr lang="en-IN"/>
+          </a:p>
+        </p:txBody>
+      </p:sp>
+      <p:sp>
+        <p:nvSpPr>
+          <p:cNvPr id="28" name="Arrow: Right 27">
+            <a:extLst>
+              <a:ext uri="{FF2B5EF4-FFF2-40B4-BE49-F238E27FC236}">
+                <a16:creationId xmlns:a16="http://schemas.microsoft.com/office/drawing/2014/main" id="{34C8304A-9B8E-4837-82B8-1263DA122D2C}"/>
+              </a:ext>
+            </a:extLst>
+          </p:cNvPr>
+          <p:cNvSpPr/>
+          <p:nvPr/>
+        </p:nvSpPr>
+        <p:spPr>
+          <a:xfrm>
+            <a:off x="9808689" y="4343400"/>
+            <a:ext cx="396486" cy="76200"/>
+          </a:xfrm>
+          <a:prstGeom prst="rightArrow">
+            <a:avLst/>
+          </a:prstGeom>
+          <a:solidFill>
+            <a:srgbClr val="00B949"/>
+          </a:solidFill>
+          <a:ln>
             <a:solidFill>
-              <a:srgbClr val="00B949"/>
+              <a:srgbClr val="32CA8C"/>
             </a:solidFill>
-            <a:ln>
-              <a:solidFill>
-                <a:srgbClr val="32CA8C"/>
-              </a:solidFill>
-            </a:ln>
-          </p:spPr>
-          <p:style>
-            <a:lnRef idx="2">
-              <a:schemeClr val="accent6">
-                <a:shade val="50000"/>
-              </a:schemeClr>
-            </a:lnRef>
-            <a:fillRef idx="1">
-              <a:schemeClr val="accent6"/>
-            </a:fillRef>
-            <a:effectRef idx="0">
-              <a:schemeClr val="accent6"/>
-            </a:effectRef>
-            <a:fontRef idx="minor">
-              <a:schemeClr val="lt1"/>
-            </a:fontRef>
-          </p:style>
-          <p:txBody>
-            <a:bodyPr rtlCol="0" anchor="ctr"/>
-            <a:lstStyle/>
-            <a:p>
-              <a:pPr algn="ctr"/>
-              <a:endParaRPr lang="en-IN"/>
-            </a:p>
-          </p:txBody>
-        </p:sp>
-      </p:grpSp>
+          </a:ln>
+        </p:spPr>
+        <p:style>
+          <a:lnRef idx="2">
+            <a:schemeClr val="accent6">
+              <a:shade val="50000"/>
+            </a:schemeClr>
+          </a:lnRef>
+          <a:fillRef idx="1">
+            <a:schemeClr val="accent6"/>
+          </a:fillRef>
+          <a:effectRef idx="0">
+            <a:schemeClr val="accent6"/>
+          </a:effectRef>
+          <a:fontRef idx="minor">
+            <a:schemeClr val="lt1"/>
+          </a:fontRef>
+        </p:style>
+        <p:txBody>
+          <a:bodyPr rtlCol="0" anchor="ctr"/>
+          <a:lstStyle/>
+          <a:p>
+            <a:pPr algn="ctr"/>
+            <a:endParaRPr lang="en-IN"/>
+          </a:p>
+        </p:txBody>
+      </p:sp>
+      <p:pic>
+        <p:nvPicPr>
+          <p:cNvPr id="6" name="Picture 5" descr="Shape, arrow&#10;&#10;Description automatically generated">
+            <a:extLst>
+              <a:ext uri="{FF2B5EF4-FFF2-40B4-BE49-F238E27FC236}">
+                <a16:creationId xmlns:a16="http://schemas.microsoft.com/office/drawing/2014/main" id="{89172A72-2691-43C2-921E-787AA251E4A7}"/>
+              </a:ext>
+            </a:extLst>
+          </p:cNvPr>
+          <p:cNvPicPr>
+            <a:picLocks noChangeAspect="1"/>
+          </p:cNvPicPr>
+          <p:nvPr/>
+        </p:nvPicPr>
+        <p:blipFill>
+          <a:blip r:embed="rId4">
+            <a:extLst>
+              <a:ext uri="{28A0092B-C50C-407E-A947-70E740481C1C}">
+                <a14:useLocalDpi xmlns:a14="http://schemas.microsoft.com/office/drawing/2010/main" val="0"/>
+              </a:ext>
+            </a:extLst>
+          </a:blip>
+          <a:stretch>
+            <a:fillRect/>
+          </a:stretch>
+        </p:blipFill>
+        <p:spPr>
+          <a:xfrm>
+            <a:off x="355978" y="3600450"/>
+            <a:ext cx="1657350" cy="1657350"/>
+          </a:xfrm>
+          <a:prstGeom prst="rect">
+            <a:avLst/>
+          </a:prstGeom>
+          <a:ln>
+            <a:solidFill>
+              <a:schemeClr val="tx1"/>
+            </a:solidFill>
+          </a:ln>
+        </p:spPr>
+      </p:pic>
+      <p:pic>
+        <p:nvPicPr>
+          <p:cNvPr id="8" name="Picture 7" descr="A picture containing text, dark, night sky&#10;&#10;Description automatically generated">
+            <a:extLst>
+              <a:ext uri="{FF2B5EF4-FFF2-40B4-BE49-F238E27FC236}">
+                <a16:creationId xmlns:a16="http://schemas.microsoft.com/office/drawing/2014/main" id="{1F940B2F-010F-4E36-838A-7A4D965091A2}"/>
+              </a:ext>
+            </a:extLst>
+          </p:cNvPr>
+          <p:cNvPicPr>
+            <a:picLocks noChangeAspect="1"/>
+          </p:cNvPicPr>
+          <p:nvPr/>
+        </p:nvPicPr>
+        <p:blipFill>
+          <a:blip r:embed="rId5">
+            <a:extLst>
+              <a:ext uri="{28A0092B-C50C-407E-A947-70E740481C1C}">
+                <a14:useLocalDpi xmlns:a14="http://schemas.microsoft.com/office/drawing/2010/main" val="0"/>
+              </a:ext>
+            </a:extLst>
+          </a:blip>
+          <a:stretch>
+            <a:fillRect/>
+          </a:stretch>
+        </p:blipFill>
+        <p:spPr>
+          <a:xfrm>
+            <a:off x="10248900" y="3543300"/>
+            <a:ext cx="1714500" cy="1714500"/>
+          </a:xfrm>
+          <a:prstGeom prst="rect">
+            <a:avLst/>
+          </a:prstGeom>
+          <a:ln>
+            <a:solidFill>
+              <a:schemeClr val="tx1"/>
+            </a:solidFill>
+          </a:ln>
+        </p:spPr>
+      </p:pic>
     </p:spTree>
     <p:extLst>
       <p:ext uri="{BB962C8B-B14F-4D97-AF65-F5344CB8AC3E}">
@@ -7707,13 +7900,41 @@
       </p:grpSpPr>
       <p:sp>
         <p:nvSpPr>
-          <p:cNvPr id="2" name="Content Placeholder 2">
-            <a:extLst>
-              <a:ext uri="{FF2B5EF4-FFF2-40B4-BE49-F238E27FC236}">
-                <a16:creationId xmlns:a16="http://schemas.microsoft.com/office/drawing/2014/main" id="{CD6F04BA-6351-4406-93A5-201D6C83407D}"/>
-              </a:ext>
-            </a:extLst>
-          </p:cNvPr>
+          <p:cNvPr id="5" name="Rectangle 4"/>
+          <p:cNvSpPr>
+            <a:spLocks noChangeArrowheads="1"/>
+          </p:cNvSpPr>
+          <p:nvPr/>
+        </p:nvSpPr>
+        <p:spPr bwMode="auto">
+          <a:xfrm>
+            <a:off x="3048000" y="1581155"/>
+            <a:ext cx="7620000" cy="36513"/>
+          </a:xfrm>
+          <a:prstGeom prst="rect">
+            <a:avLst/>
+          </a:prstGeom>
+          <a:solidFill>
+            <a:srgbClr val="33CCCC"/>
+          </a:solidFill>
+          <a:ln w="9525">
+            <a:noFill/>
+            <a:miter lim="800000"/>
+            <a:headEnd/>
+            <a:tailEnd/>
+          </a:ln>
+        </p:spPr>
+        <p:txBody>
+          <a:bodyPr wrap="none" anchor="ctr"/>
+          <a:lstStyle/>
+          <a:p>
+            <a:endParaRPr lang="en-US"/>
+          </a:p>
+        </p:txBody>
+      </p:sp>
+      <p:sp>
+        <p:nvSpPr>
+          <p:cNvPr id="10" name="Content Placeholder 2"/>
           <p:cNvSpPr txBox="1">
             <a:spLocks/>
           </p:cNvSpPr>
@@ -7721,8 +7942,8 @@
         </p:nvSpPr>
         <p:spPr>
           <a:xfrm>
-            <a:off x="838200" y="1752601"/>
-            <a:ext cx="2438400" cy="461666"/>
+            <a:off x="841296" y="1689848"/>
+            <a:ext cx="8077200" cy="943816"/>
           </a:xfrm>
           <a:prstGeom prst="rect">
             <a:avLst/>
@@ -7750,10 +7971,48 @@
                   <a:srgbClr val="0033CC"/>
                 </a:solidFill>
                 <a:latin typeface="Trebuchet MS"/>
+                <a:ea typeface="Trebuchet MS"/>
+                <a:cs typeface="Trebuchet MS"/>
                 <a:sym typeface="Trebuchet MS"/>
               </a:rPr>
-              <a:t>Basic approach</a:t>
-            </a:r>
+              <a:t>2. Autoencoders</a:t>
+            </a:r>
+          </a:p>
+          <a:p>
+            <a:pPr algn="just">
+              <a:spcBef>
+                <a:spcPts val="480"/>
+              </a:spcBef>
+              <a:spcAft>
+                <a:spcPts val="0"/>
+              </a:spcAft>
+              <a:buClr>
+                <a:schemeClr val="dk1"/>
+              </a:buClr>
+              <a:buSzPts val="1100"/>
+            </a:pPr>
+            <a:r>
+              <a:rPr lang="en-US" sz="2400" b="1" dirty="0">
+                <a:solidFill>
+                  <a:srgbClr val="0033CC"/>
+                </a:solidFill>
+                <a:latin typeface="Trebuchet MS"/>
+                <a:ea typeface="Trebuchet MS"/>
+                <a:cs typeface="Trebuchet MS"/>
+                <a:sym typeface="Trebuchet MS"/>
+              </a:rPr>
+              <a:t>Model architecture</a:t>
+            </a:r>
+          </a:p>
+          <a:p>
+            <a:pPr marL="457200" lvl="0" algn="just">
+              <a:spcBef>
+                <a:spcPts val="480"/>
+              </a:spcBef>
+              <a:spcAft>
+                <a:spcPts val="0"/>
+              </a:spcAft>
+            </a:pPr>
             <a:endParaRPr lang="en-US" sz="2400" dirty="0">
               <a:solidFill>
                 <a:srgbClr val="0033CC"/>
@@ -7802,36 +8061,11 @@
               <a:sym typeface="Trebuchet MS"/>
             </a:endParaRPr>
           </a:p>
-          <a:p>
-            <a:pPr marL="457200" lvl="0" algn="just">
-              <a:spcBef>
-                <a:spcPts val="480"/>
-              </a:spcBef>
-              <a:spcAft>
-                <a:spcPts val="0"/>
-              </a:spcAft>
-            </a:pPr>
-            <a:endParaRPr lang="en-US" sz="2400" dirty="0">
-              <a:solidFill>
-                <a:srgbClr val="0033CC"/>
-              </a:solidFill>
-              <a:latin typeface="Trebuchet MS"/>
-              <a:ea typeface="Trebuchet MS"/>
-              <a:cs typeface="Trebuchet MS"/>
-              <a:sym typeface="Trebuchet MS"/>
-            </a:endParaRPr>
-          </a:p>
         </p:txBody>
       </p:sp>
       <p:sp>
         <p:nvSpPr>
-          <p:cNvPr id="3" name="Text Box 34">
-            <a:extLst>
-              <a:ext uri="{FF2B5EF4-FFF2-40B4-BE49-F238E27FC236}">
-                <a16:creationId xmlns:a16="http://schemas.microsoft.com/office/drawing/2014/main" id="{D5243A24-7B1E-4FBF-A7A1-F5F47DC0A2EA}"/>
-              </a:ext>
-            </a:extLst>
-          </p:cNvPr>
+          <p:cNvPr id="14" name="Text Box 34"/>
           <p:cNvSpPr txBox="1">
             <a:spLocks noChangeArrowheads="1"/>
           </p:cNvSpPr>
@@ -7883,6 +8117,431 @@
           </a:p>
         </p:txBody>
       </p:sp>
+      <p:pic>
+        <p:nvPicPr>
+          <p:cNvPr id="3" name="Picture 2">
+            <a:extLst>
+              <a:ext uri="{FF2B5EF4-FFF2-40B4-BE49-F238E27FC236}">
+                <a16:creationId xmlns:a16="http://schemas.microsoft.com/office/drawing/2014/main" id="{394F7536-82F2-4706-AB02-36ADAF95C3CA}"/>
+              </a:ext>
+            </a:extLst>
+          </p:cNvPr>
+          <p:cNvPicPr>
+            <a:picLocks noChangeAspect="1"/>
+          </p:cNvPicPr>
+          <p:nvPr/>
+        </p:nvPicPr>
+        <p:blipFill rotWithShape="1">
+          <a:blip r:embed="rId3">
+            <a:extLst>
+              <a:ext uri="{28A0092B-C50C-407E-A947-70E740481C1C}">
+                <a14:useLocalDpi xmlns:a14="http://schemas.microsoft.com/office/drawing/2010/main" val="0"/>
+              </a:ext>
+            </a:extLst>
+          </a:blip>
+          <a:srcRect l="15605" t="18013" r="19897" b="33502"/>
+          <a:stretch/>
+        </p:blipFill>
+        <p:spPr>
+          <a:xfrm>
+            <a:off x="2307033" y="2897751"/>
+            <a:ext cx="7577933" cy="2538953"/>
+          </a:xfrm>
+          <a:prstGeom prst="rect">
+            <a:avLst/>
+          </a:prstGeom>
+        </p:spPr>
+      </p:pic>
+      <p:sp>
+        <p:nvSpPr>
+          <p:cNvPr id="17" name="Arrow: Right 16">
+            <a:extLst>
+              <a:ext uri="{FF2B5EF4-FFF2-40B4-BE49-F238E27FC236}">
+                <a16:creationId xmlns:a16="http://schemas.microsoft.com/office/drawing/2014/main" id="{F4EFD024-0C75-483A-B7D0-065E5584D420}"/>
+              </a:ext>
+            </a:extLst>
+          </p:cNvPr>
+          <p:cNvSpPr/>
+          <p:nvPr/>
+        </p:nvSpPr>
+        <p:spPr>
+          <a:xfrm>
+            <a:off x="2023267" y="4343400"/>
+            <a:ext cx="320209" cy="76200"/>
+          </a:xfrm>
+          <a:prstGeom prst="rightArrow">
+            <a:avLst/>
+          </a:prstGeom>
+        </p:spPr>
+        <p:style>
+          <a:lnRef idx="2">
+            <a:schemeClr val="accent1">
+              <a:shade val="50000"/>
+            </a:schemeClr>
+          </a:lnRef>
+          <a:fillRef idx="1">
+            <a:schemeClr val="accent1"/>
+          </a:fillRef>
+          <a:effectRef idx="0">
+            <a:schemeClr val="accent1"/>
+          </a:effectRef>
+          <a:fontRef idx="minor">
+            <a:schemeClr val="lt1"/>
+          </a:fontRef>
+        </p:style>
+        <p:txBody>
+          <a:bodyPr rtlCol="0" anchor="ctr"/>
+          <a:lstStyle/>
+          <a:p>
+            <a:pPr algn="ctr"/>
+            <a:endParaRPr lang="en-IN"/>
+          </a:p>
+        </p:txBody>
+      </p:sp>
+      <p:sp>
+        <p:nvSpPr>
+          <p:cNvPr id="28" name="Arrow: Right 27">
+            <a:extLst>
+              <a:ext uri="{FF2B5EF4-FFF2-40B4-BE49-F238E27FC236}">
+                <a16:creationId xmlns:a16="http://schemas.microsoft.com/office/drawing/2014/main" id="{34C8304A-9B8E-4837-82B8-1263DA122D2C}"/>
+              </a:ext>
+            </a:extLst>
+          </p:cNvPr>
+          <p:cNvSpPr/>
+          <p:nvPr/>
+        </p:nvSpPr>
+        <p:spPr>
+          <a:xfrm>
+            <a:off x="9808689" y="4343400"/>
+            <a:ext cx="396486" cy="76200"/>
+          </a:xfrm>
+          <a:prstGeom prst="rightArrow">
+            <a:avLst/>
+          </a:prstGeom>
+          <a:solidFill>
+            <a:srgbClr val="00B949"/>
+          </a:solidFill>
+          <a:ln>
+            <a:solidFill>
+              <a:srgbClr val="32CA8C"/>
+            </a:solidFill>
+          </a:ln>
+        </p:spPr>
+        <p:style>
+          <a:lnRef idx="2">
+            <a:schemeClr val="accent6">
+              <a:shade val="50000"/>
+            </a:schemeClr>
+          </a:lnRef>
+          <a:fillRef idx="1">
+            <a:schemeClr val="accent6"/>
+          </a:fillRef>
+          <a:effectRef idx="0">
+            <a:schemeClr val="accent6"/>
+          </a:effectRef>
+          <a:fontRef idx="minor">
+            <a:schemeClr val="lt1"/>
+          </a:fontRef>
+        </p:style>
+        <p:txBody>
+          <a:bodyPr rtlCol="0" anchor="ctr"/>
+          <a:lstStyle/>
+          <a:p>
+            <a:pPr algn="ctr"/>
+            <a:endParaRPr lang="en-IN"/>
+          </a:p>
+        </p:txBody>
+      </p:sp>
+      <p:pic>
+        <p:nvPicPr>
+          <p:cNvPr id="6" name="Picture 5" descr="A picture containing text, clipart&#10;&#10;Description automatically generated">
+            <a:extLst>
+              <a:ext uri="{FF2B5EF4-FFF2-40B4-BE49-F238E27FC236}">
+                <a16:creationId xmlns:a16="http://schemas.microsoft.com/office/drawing/2014/main" id="{8CAD1066-FECB-43F8-9AD4-6A578193EF47}"/>
+              </a:ext>
+            </a:extLst>
+          </p:cNvPr>
+          <p:cNvPicPr>
+            <a:picLocks noChangeAspect="1"/>
+          </p:cNvPicPr>
+          <p:nvPr/>
+        </p:nvPicPr>
+        <p:blipFill>
+          <a:blip r:embed="rId4">
+            <a:extLst>
+              <a:ext uri="{28A0092B-C50C-407E-A947-70E740481C1C}">
+                <a14:useLocalDpi xmlns:a14="http://schemas.microsoft.com/office/drawing/2010/main" val="0"/>
+              </a:ext>
+            </a:extLst>
+          </a:blip>
+          <a:stretch>
+            <a:fillRect/>
+          </a:stretch>
+        </p:blipFill>
+        <p:spPr>
+          <a:xfrm>
+            <a:off x="493154" y="3603906"/>
+            <a:ext cx="1564246" cy="1564246"/>
+          </a:xfrm>
+          <a:prstGeom prst="rect">
+            <a:avLst/>
+          </a:prstGeom>
+          <a:ln>
+            <a:solidFill>
+              <a:schemeClr val="tx1"/>
+            </a:solidFill>
+          </a:ln>
+        </p:spPr>
+      </p:pic>
+      <p:pic>
+        <p:nvPicPr>
+          <p:cNvPr id="8" name="Picture 7">
+            <a:extLst>
+              <a:ext uri="{FF2B5EF4-FFF2-40B4-BE49-F238E27FC236}">
+                <a16:creationId xmlns:a16="http://schemas.microsoft.com/office/drawing/2014/main" id="{D6BCDED7-6526-4A3A-A394-0DC2F01943DD}"/>
+              </a:ext>
+            </a:extLst>
+          </p:cNvPr>
+          <p:cNvPicPr>
+            <a:picLocks noChangeAspect="1"/>
+          </p:cNvPicPr>
+          <p:nvPr/>
+        </p:nvPicPr>
+        <p:blipFill>
+          <a:blip r:embed="rId5">
+            <a:extLst>
+              <a:ext uri="{28A0092B-C50C-407E-A947-70E740481C1C}">
+                <a14:useLocalDpi xmlns:a14="http://schemas.microsoft.com/office/drawing/2010/main" val="0"/>
+              </a:ext>
+            </a:extLst>
+          </a:blip>
+          <a:stretch>
+            <a:fillRect/>
+          </a:stretch>
+        </p:blipFill>
+        <p:spPr>
+          <a:xfrm>
+            <a:off x="10210800" y="3638555"/>
+            <a:ext cx="1543045" cy="1543045"/>
+          </a:xfrm>
+          <a:prstGeom prst="rect">
+            <a:avLst/>
+          </a:prstGeom>
+          <a:ln>
+            <a:solidFill>
+              <a:schemeClr val="tx1"/>
+            </a:solidFill>
+          </a:ln>
+        </p:spPr>
+      </p:pic>
+    </p:spTree>
+    <p:extLst>
+      <p:ext uri="{BB962C8B-B14F-4D97-AF65-F5344CB8AC3E}">
+        <p14:creationId xmlns:p14="http://schemas.microsoft.com/office/powerpoint/2010/main" val="3297916160"/>
+      </p:ext>
+    </p:extLst>
+  </p:cSld>
+  <p:clrMapOvr>
+    <a:masterClrMapping/>
+  </p:clrMapOvr>
+</p:sld>
+</file>
+
+<file path=ppt/slides/slide17.xml><?xml version="1.0" encoding="utf-8"?>
+<p:sld xmlns:a="http://schemas.openxmlformats.org/drawingml/2006/main" xmlns:r="http://schemas.openxmlformats.org/officeDocument/2006/relationships" xmlns:p="http://schemas.openxmlformats.org/presentationml/2006/main">
+  <p:cSld>
+    <p:spTree>
+      <p:nvGrpSpPr>
+        <p:cNvPr id="1" name=""/>
+        <p:cNvGrpSpPr/>
+        <p:nvPr/>
+      </p:nvGrpSpPr>
+      <p:grpSpPr>
+        <a:xfrm>
+          <a:off x="0" y="0"/>
+          <a:ext cx="0" cy="0"/>
+          <a:chOff x="0" y="0"/>
+          <a:chExt cx="0" cy="0"/>
+        </a:xfrm>
+      </p:grpSpPr>
+      <p:sp>
+        <p:nvSpPr>
+          <p:cNvPr id="2" name="Content Placeholder 2">
+            <a:extLst>
+              <a:ext uri="{FF2B5EF4-FFF2-40B4-BE49-F238E27FC236}">
+                <a16:creationId xmlns:a16="http://schemas.microsoft.com/office/drawing/2014/main" id="{CD6F04BA-6351-4406-93A5-201D6C83407D}"/>
+              </a:ext>
+            </a:extLst>
+          </p:cNvPr>
+          <p:cNvSpPr txBox="1">
+            <a:spLocks/>
+          </p:cNvSpPr>
+          <p:nvPr/>
+        </p:nvSpPr>
+        <p:spPr>
+          <a:xfrm>
+            <a:off x="838200" y="1752601"/>
+            <a:ext cx="2438400" cy="461666"/>
+          </a:xfrm>
+          <a:prstGeom prst="rect">
+            <a:avLst/>
+          </a:prstGeom>
+        </p:spPr>
+        <p:txBody>
+          <a:bodyPr/>
+          <a:lstStyle/>
+          <a:p>
+            <a:pPr algn="just">
+              <a:spcBef>
+                <a:spcPts val="480"/>
+              </a:spcBef>
+              <a:spcAft>
+                <a:spcPts val="0"/>
+              </a:spcAft>
+              <a:buClr>
+                <a:schemeClr val="dk1"/>
+              </a:buClr>
+              <a:buSzPts val="1100"/>
+            </a:pPr>
+            <a:r>
+              <a:rPr lang="en-US" sz="2400" b="1" dirty="0">
+                <a:solidFill>
+                  <a:srgbClr val="0033CC"/>
+                </a:solidFill>
+                <a:latin typeface="Trebuchet MS"/>
+                <a:sym typeface="Trebuchet MS"/>
+              </a:rPr>
+              <a:t>Basic approach</a:t>
+            </a:r>
+            <a:endParaRPr lang="en-US" sz="2400" dirty="0">
+              <a:solidFill>
+                <a:srgbClr val="0033CC"/>
+              </a:solidFill>
+              <a:latin typeface="Trebuchet MS"/>
+              <a:ea typeface="Trebuchet MS"/>
+              <a:cs typeface="Trebuchet MS"/>
+              <a:sym typeface="Trebuchet MS"/>
+            </a:endParaRPr>
+          </a:p>
+          <a:p>
+            <a:pPr marL="457200" lvl="0" algn="just">
+              <a:spcBef>
+                <a:spcPts val="480"/>
+              </a:spcBef>
+              <a:spcAft>
+                <a:spcPts val="0"/>
+              </a:spcAft>
+            </a:pPr>
+            <a:endParaRPr lang="en-US" sz="2400" dirty="0">
+              <a:solidFill>
+                <a:srgbClr val="0033CC"/>
+              </a:solidFill>
+              <a:latin typeface="Trebuchet MS"/>
+              <a:ea typeface="Trebuchet MS"/>
+              <a:cs typeface="Trebuchet MS"/>
+              <a:sym typeface="Trebuchet MS"/>
+            </a:endParaRPr>
+          </a:p>
+          <a:p>
+            <a:pPr marL="457200" lvl="0" algn="just">
+              <a:spcBef>
+                <a:spcPts val="480"/>
+              </a:spcBef>
+              <a:spcAft>
+                <a:spcPts val="0"/>
+              </a:spcAft>
+            </a:pPr>
+            <a:endParaRPr lang="en-US" sz="2400" dirty="0">
+              <a:solidFill>
+                <a:srgbClr val="0033CC"/>
+              </a:solidFill>
+              <a:latin typeface="Trebuchet MS"/>
+              <a:ea typeface="Trebuchet MS"/>
+              <a:cs typeface="Trebuchet MS"/>
+              <a:sym typeface="Trebuchet MS"/>
+            </a:endParaRPr>
+          </a:p>
+          <a:p>
+            <a:pPr marL="457200" lvl="0" algn="just">
+              <a:spcBef>
+                <a:spcPts val="480"/>
+              </a:spcBef>
+              <a:spcAft>
+                <a:spcPts val="0"/>
+              </a:spcAft>
+            </a:pPr>
+            <a:endParaRPr lang="en-US" sz="2400" dirty="0">
+              <a:solidFill>
+                <a:srgbClr val="0033CC"/>
+              </a:solidFill>
+              <a:latin typeface="Trebuchet MS"/>
+              <a:ea typeface="Trebuchet MS"/>
+              <a:cs typeface="Trebuchet MS"/>
+              <a:sym typeface="Trebuchet MS"/>
+            </a:endParaRPr>
+          </a:p>
+        </p:txBody>
+      </p:sp>
+      <p:sp>
+        <p:nvSpPr>
+          <p:cNvPr id="3" name="Text Box 34">
+            <a:extLst>
+              <a:ext uri="{FF2B5EF4-FFF2-40B4-BE49-F238E27FC236}">
+                <a16:creationId xmlns:a16="http://schemas.microsoft.com/office/drawing/2014/main" id="{D5243A24-7B1E-4FBF-A7A1-F5F47DC0A2EA}"/>
+              </a:ext>
+            </a:extLst>
+          </p:cNvPr>
+          <p:cNvSpPr txBox="1">
+            <a:spLocks noChangeArrowheads="1"/>
+          </p:cNvSpPr>
+          <p:nvPr/>
+        </p:nvSpPr>
+        <p:spPr bwMode="auto">
+          <a:xfrm>
+            <a:off x="2895600" y="990600"/>
+            <a:ext cx="7848600" cy="461665"/>
+          </a:xfrm>
+          <a:prstGeom prst="rect">
+            <a:avLst/>
+          </a:prstGeom>
+          <a:noFill/>
+          <a:ln w="9525">
+            <a:noFill/>
+            <a:miter lim="800000"/>
+            <a:headEnd/>
+            <a:tailEnd/>
+          </a:ln>
+        </p:spPr>
+        <p:txBody>
+          <a:bodyPr wrap="square">
+            <a:spAutoFit/>
+          </a:bodyPr>
+          <a:lstStyle/>
+          <a:p>
+            <a:pPr marL="342900" lvl="0" indent="-342900" algn="r">
+              <a:spcBef>
+                <a:spcPts val="0"/>
+              </a:spcBef>
+              <a:spcAft>
+                <a:spcPts val="0"/>
+              </a:spcAft>
+            </a:pPr>
+            <a:r>
+              <a:rPr lang="en-US" sz="2400" dirty="0">
+                <a:solidFill>
+                  <a:srgbClr val="FF0000"/>
+                </a:solidFill>
+                <a:latin typeface="Trebuchet MS"/>
+                <a:ea typeface="Trebuchet MS"/>
+                <a:cs typeface="Trebuchet MS"/>
+                <a:sym typeface="Trebuchet MS"/>
+              </a:rPr>
+              <a:t>Proposed Approach / Methodology</a:t>
+            </a:r>
+            <a:endParaRPr lang="en-US" sz="2400" dirty="0"/>
+          </a:p>
+        </p:txBody>
+      </p:sp>
       <p:sp>
         <p:nvSpPr>
           <p:cNvPr id="4" name="Rectangle 3">
@@ -8404,7 +9063,7 @@
 </p:sld>
 </file>
 
-<file path=ppt/slides/slide17.xml><?xml version="1.0" encoding="utf-8"?>
+<file path=ppt/slides/slide18.xml><?xml version="1.0" encoding="utf-8"?>
 <p:sld xmlns:a="http://schemas.openxmlformats.org/drawingml/2006/main" xmlns:r="http://schemas.openxmlformats.org/officeDocument/2006/relationships" xmlns:p="http://schemas.openxmlformats.org/presentationml/2006/main">
   <p:cSld>
     <p:spTree>
@@ -9036,7 +9695,7 @@
 </p:sld>
 </file>
 
-<file path=ppt/slides/slide18.xml><?xml version="1.0" encoding="utf-8"?>
+<file path=ppt/slides/slide19.xml><?xml version="1.0" encoding="utf-8"?>
 <p:sld xmlns:a="http://schemas.openxmlformats.org/drawingml/2006/main" xmlns:r="http://schemas.openxmlformats.org/officeDocument/2006/relationships" xmlns:p="http://schemas.openxmlformats.org/presentationml/2006/main">
   <p:cSld>
     <p:spTree>
@@ -9432,13 +10091,13 @@
               </a:ext>
             </a:extLst>
           </a:blip>
-          <a:srcRect l="11875" t="14175" r="8750" b="14175"/>
+          <a:srcRect l="11875" t="14175" r="25234" b="14175"/>
           <a:stretch/>
         </p:blipFill>
         <p:spPr>
           <a:xfrm>
-            <a:off x="1371600" y="2270142"/>
-            <a:ext cx="9809736" cy="1771019"/>
+            <a:off x="2209799" y="2270142"/>
+            <a:ext cx="8005354" cy="1824100"/>
           </a:xfrm>
           <a:prstGeom prst="rect">
             <a:avLst/>
@@ -9467,13 +10126,13 @@
               </a:ext>
             </a:extLst>
           </a:blip>
-          <a:srcRect l="11875" t="14175" r="8750" b="14175"/>
+          <a:srcRect l="11875" t="14175" r="24670" b="14175"/>
           <a:stretch/>
         </p:blipFill>
         <p:spPr>
           <a:xfrm>
-            <a:off x="1371600" y="4771445"/>
-            <a:ext cx="10103759" cy="1824100"/>
+            <a:off x="2209800" y="4771445"/>
+            <a:ext cx="8077200" cy="1824100"/>
           </a:xfrm>
           <a:prstGeom prst="rect">
             <a:avLst/>
@@ -9484,392 +10143,6 @@
     <p:extLst>
       <p:ext uri="{BB962C8B-B14F-4D97-AF65-F5344CB8AC3E}">
         <p14:creationId xmlns:p14="http://schemas.microsoft.com/office/powerpoint/2010/main" val="3584053277"/>
-      </p:ext>
-    </p:extLst>
-  </p:cSld>
-  <p:clrMapOvr>
-    <a:masterClrMapping/>
-  </p:clrMapOvr>
-</p:sld>
-</file>
-
-<file path=ppt/slides/slide19.xml><?xml version="1.0" encoding="utf-8"?>
-<p:sld xmlns:a="http://schemas.openxmlformats.org/drawingml/2006/main" xmlns:r="http://schemas.openxmlformats.org/officeDocument/2006/relationships" xmlns:p="http://schemas.openxmlformats.org/presentationml/2006/main">
-  <p:cSld>
-    <p:spTree>
-      <p:nvGrpSpPr>
-        <p:cNvPr id="1" name=""/>
-        <p:cNvGrpSpPr/>
-        <p:nvPr/>
-      </p:nvGrpSpPr>
-      <p:grpSpPr>
-        <a:xfrm>
-          <a:off x="0" y="0"/>
-          <a:ext cx="0" cy="0"/>
-          <a:chOff x="0" y="0"/>
-          <a:chExt cx="0" cy="0"/>
-        </a:xfrm>
-      </p:grpSpPr>
-      <p:sp>
-        <p:nvSpPr>
-          <p:cNvPr id="3" name="Text Box 34">
-            <a:extLst>
-              <a:ext uri="{FF2B5EF4-FFF2-40B4-BE49-F238E27FC236}">
-                <a16:creationId xmlns:a16="http://schemas.microsoft.com/office/drawing/2014/main" id="{D5243A24-7B1E-4FBF-A7A1-F5F47DC0A2EA}"/>
-              </a:ext>
-            </a:extLst>
-          </p:cNvPr>
-          <p:cNvSpPr txBox="1">
-            <a:spLocks noChangeArrowheads="1"/>
-          </p:cNvSpPr>
-          <p:nvPr/>
-        </p:nvSpPr>
-        <p:spPr bwMode="auto">
-          <a:xfrm>
-            <a:off x="2895600" y="990600"/>
-            <a:ext cx="7848600" cy="461665"/>
-          </a:xfrm>
-          <a:prstGeom prst="rect">
-            <a:avLst/>
-          </a:prstGeom>
-          <a:noFill/>
-          <a:ln w="9525">
-            <a:noFill/>
-            <a:miter lim="800000"/>
-            <a:headEnd/>
-            <a:tailEnd/>
-          </a:ln>
-        </p:spPr>
-        <p:txBody>
-          <a:bodyPr wrap="square">
-            <a:spAutoFit/>
-          </a:bodyPr>
-          <a:lstStyle/>
-          <a:p>
-            <a:pPr marL="342900" lvl="0" indent="-342900" algn="r">
-              <a:spcBef>
-                <a:spcPts val="0"/>
-              </a:spcBef>
-              <a:spcAft>
-                <a:spcPts val="0"/>
-              </a:spcAft>
-            </a:pPr>
-            <a:r>
-              <a:rPr lang="en-US" sz="2400" dirty="0">
-                <a:solidFill>
-                  <a:srgbClr val="FF0000"/>
-                </a:solidFill>
-                <a:latin typeface="Trebuchet MS"/>
-                <a:ea typeface="Trebuchet MS"/>
-                <a:cs typeface="Trebuchet MS"/>
-                <a:sym typeface="Trebuchet MS"/>
-              </a:rPr>
-              <a:t>Proposed Approach / Methodology</a:t>
-            </a:r>
-            <a:endParaRPr lang="en-US" sz="2400" dirty="0"/>
-          </a:p>
-        </p:txBody>
-      </p:sp>
-      <p:sp>
-        <p:nvSpPr>
-          <p:cNvPr id="5" name="Content Placeholder 2">
-            <a:extLst>
-              <a:ext uri="{FF2B5EF4-FFF2-40B4-BE49-F238E27FC236}">
-                <a16:creationId xmlns:a16="http://schemas.microsoft.com/office/drawing/2014/main" id="{F2FE3B10-5CE6-477B-8B07-14436C598129}"/>
-              </a:ext>
-            </a:extLst>
-          </p:cNvPr>
-          <p:cNvSpPr txBox="1">
-            <a:spLocks/>
-          </p:cNvSpPr>
-          <p:nvPr/>
-        </p:nvSpPr>
-        <p:spPr>
-          <a:xfrm>
-            <a:off x="800100" y="1676400"/>
-            <a:ext cx="2286000" cy="461666"/>
-          </a:xfrm>
-          <a:prstGeom prst="rect">
-            <a:avLst/>
-          </a:prstGeom>
-        </p:spPr>
-        <p:txBody>
-          <a:bodyPr/>
-          <a:lstStyle/>
-          <a:p>
-            <a:pPr algn="just">
-              <a:spcBef>
-                <a:spcPts val="480"/>
-              </a:spcBef>
-              <a:spcAft>
-                <a:spcPts val="0"/>
-              </a:spcAft>
-              <a:buClr>
-                <a:schemeClr val="dk1"/>
-              </a:buClr>
-              <a:buSzPts val="1100"/>
-            </a:pPr>
-            <a:r>
-              <a:rPr lang="en-US" sz="2400" b="1" dirty="0">
-                <a:solidFill>
-                  <a:srgbClr val="0033CC"/>
-                </a:solidFill>
-                <a:latin typeface="Trebuchet MS"/>
-                <a:sym typeface="Trebuchet MS"/>
-              </a:rPr>
-              <a:t>Benefits</a:t>
-            </a:r>
-          </a:p>
-          <a:p>
-            <a:pPr algn="just">
-              <a:spcBef>
-                <a:spcPts val="480"/>
-              </a:spcBef>
-              <a:spcAft>
-                <a:spcPts val="0"/>
-              </a:spcAft>
-              <a:buClr>
-                <a:schemeClr val="dk1"/>
-              </a:buClr>
-              <a:buSzPts val="1100"/>
-            </a:pPr>
-            <a:endParaRPr lang="en-US" sz="2400" dirty="0">
-              <a:solidFill>
-                <a:srgbClr val="0033CC"/>
-              </a:solidFill>
-              <a:latin typeface="Trebuchet MS"/>
-              <a:ea typeface="Trebuchet MS"/>
-              <a:cs typeface="Trebuchet MS"/>
-              <a:sym typeface="Trebuchet MS"/>
-            </a:endParaRPr>
-          </a:p>
-        </p:txBody>
-      </p:sp>
-      <p:sp>
-        <p:nvSpPr>
-          <p:cNvPr id="6" name="Rectangle 5">
-            <a:extLst>
-              <a:ext uri="{FF2B5EF4-FFF2-40B4-BE49-F238E27FC236}">
-                <a16:creationId xmlns:a16="http://schemas.microsoft.com/office/drawing/2014/main" id="{29A92C8C-9E14-4F8F-B8DB-F2292094C467}"/>
-              </a:ext>
-            </a:extLst>
-          </p:cNvPr>
-          <p:cNvSpPr/>
-          <p:nvPr/>
-        </p:nvSpPr>
-        <p:spPr>
-          <a:xfrm>
-            <a:off x="800100" y="2138066"/>
-            <a:ext cx="10591800" cy="1569660"/>
-          </a:xfrm>
-          <a:prstGeom prst="rect">
-            <a:avLst/>
-          </a:prstGeom>
-        </p:spPr>
-        <p:txBody>
-          <a:bodyPr wrap="square">
-            <a:spAutoFit/>
-          </a:bodyPr>
-          <a:lstStyle/>
-          <a:p>
-            <a:pPr marL="342900" indent="-342900">
-              <a:buFont typeface="Arial" panose="020B0604020202020204" pitchFamily="34" charset="0"/>
-              <a:buChar char="•"/>
-            </a:pPr>
-            <a:r>
-              <a:rPr lang="en-US" sz="2400" dirty="0">
-                <a:solidFill>
-                  <a:srgbClr val="0033CC"/>
-                </a:solidFill>
-                <a:latin typeface="Trebuchet MS"/>
-              </a:rPr>
-              <a:t>Just a single trained autoencoder can be used to generate fonts for every character of Kannada language. </a:t>
-            </a:r>
-          </a:p>
-          <a:p>
-            <a:pPr marL="342900" indent="-342900">
-              <a:buFont typeface="Arial" panose="020B0604020202020204" pitchFamily="34" charset="0"/>
-              <a:buChar char="•"/>
-            </a:pPr>
-            <a:r>
-              <a:rPr lang="en-US" sz="2400" dirty="0">
-                <a:solidFill>
-                  <a:srgbClr val="0033CC"/>
-                </a:solidFill>
-                <a:latin typeface="Trebuchet MS"/>
-              </a:rPr>
-              <a:t>Models are comparatively smaller.</a:t>
-            </a:r>
-          </a:p>
-          <a:p>
-            <a:pPr marL="342900" indent="-342900">
-              <a:buFont typeface="Arial" panose="020B0604020202020204" pitchFamily="34" charset="0"/>
-              <a:buChar char="•"/>
-            </a:pPr>
-            <a:r>
-              <a:rPr lang="en-US" sz="2400" dirty="0">
-                <a:solidFill>
-                  <a:srgbClr val="0033CC"/>
-                </a:solidFill>
-                <a:latin typeface="Trebuchet MS"/>
-              </a:rPr>
-              <a:t>Generation is very quick.</a:t>
-            </a:r>
-          </a:p>
-        </p:txBody>
-      </p:sp>
-      <p:sp>
-        <p:nvSpPr>
-          <p:cNvPr id="7" name="Content Placeholder 2">
-            <a:extLst>
-              <a:ext uri="{FF2B5EF4-FFF2-40B4-BE49-F238E27FC236}">
-                <a16:creationId xmlns:a16="http://schemas.microsoft.com/office/drawing/2014/main" id="{A89DFB97-3C3A-4847-B7C5-95B8C6707D08}"/>
-              </a:ext>
-            </a:extLst>
-          </p:cNvPr>
-          <p:cNvSpPr txBox="1">
-            <a:spLocks/>
-          </p:cNvSpPr>
-          <p:nvPr/>
-        </p:nvSpPr>
-        <p:spPr>
-          <a:xfrm>
-            <a:off x="800100" y="3938559"/>
-            <a:ext cx="2286000" cy="461666"/>
-          </a:xfrm>
-          <a:prstGeom prst="rect">
-            <a:avLst/>
-          </a:prstGeom>
-        </p:spPr>
-        <p:txBody>
-          <a:bodyPr/>
-          <a:lstStyle/>
-          <a:p>
-            <a:pPr algn="just">
-              <a:spcBef>
-                <a:spcPts val="480"/>
-              </a:spcBef>
-              <a:spcAft>
-                <a:spcPts val="0"/>
-              </a:spcAft>
-              <a:buClr>
-                <a:schemeClr val="dk1"/>
-              </a:buClr>
-              <a:buSzPts val="1100"/>
-            </a:pPr>
-            <a:r>
-              <a:rPr lang="en-US" sz="2400" b="1" dirty="0">
-                <a:solidFill>
-                  <a:srgbClr val="0033CC"/>
-                </a:solidFill>
-                <a:latin typeface="Trebuchet MS"/>
-                <a:sym typeface="Trebuchet MS"/>
-              </a:rPr>
-              <a:t>Drawbacks</a:t>
-            </a:r>
-          </a:p>
-          <a:p>
-            <a:pPr algn="just">
-              <a:spcBef>
-                <a:spcPts val="480"/>
-              </a:spcBef>
-              <a:spcAft>
-                <a:spcPts val="0"/>
-              </a:spcAft>
-              <a:buClr>
-                <a:schemeClr val="dk1"/>
-              </a:buClr>
-              <a:buSzPts val="1100"/>
-            </a:pPr>
-            <a:endParaRPr lang="en-US" sz="2400" dirty="0">
-              <a:solidFill>
-                <a:srgbClr val="0033CC"/>
-              </a:solidFill>
-              <a:latin typeface="Trebuchet MS"/>
-              <a:ea typeface="Trebuchet MS"/>
-              <a:cs typeface="Trebuchet MS"/>
-              <a:sym typeface="Trebuchet MS"/>
-            </a:endParaRPr>
-          </a:p>
-        </p:txBody>
-      </p:sp>
-      <p:sp>
-        <p:nvSpPr>
-          <p:cNvPr id="9" name="Rectangle 8">
-            <a:extLst>
-              <a:ext uri="{FF2B5EF4-FFF2-40B4-BE49-F238E27FC236}">
-                <a16:creationId xmlns:a16="http://schemas.microsoft.com/office/drawing/2014/main" id="{230474D7-32EA-4263-9CBB-E2803FFE4DA6}"/>
-              </a:ext>
-            </a:extLst>
-          </p:cNvPr>
-          <p:cNvSpPr/>
-          <p:nvPr/>
-        </p:nvSpPr>
-        <p:spPr>
-          <a:xfrm>
-            <a:off x="833230" y="4400225"/>
-            <a:ext cx="10591800" cy="1569660"/>
-          </a:xfrm>
-          <a:prstGeom prst="rect">
-            <a:avLst/>
-          </a:prstGeom>
-        </p:spPr>
-        <p:txBody>
-          <a:bodyPr wrap="square">
-            <a:spAutoFit/>
-          </a:bodyPr>
-          <a:lstStyle/>
-          <a:p>
-            <a:pPr marL="342900" indent="-342900">
-              <a:buFont typeface="Arial" panose="020B0604020202020204" pitchFamily="34" charset="0"/>
-              <a:buChar char="•"/>
-            </a:pPr>
-            <a:r>
-              <a:rPr lang="en-US" sz="2400" dirty="0">
-                <a:solidFill>
-                  <a:srgbClr val="0033CC"/>
-                </a:solidFill>
-                <a:latin typeface="Trebuchet MS"/>
-              </a:rPr>
-              <a:t>New model is required for each font.</a:t>
-            </a:r>
-          </a:p>
-          <a:p>
-            <a:pPr marL="342900" indent="-342900">
-              <a:buFont typeface="Arial" panose="020B0604020202020204" pitchFamily="34" charset="0"/>
-              <a:buChar char="•"/>
-            </a:pPr>
-            <a:r>
-              <a:rPr lang="en-US" sz="2400" dirty="0">
-                <a:solidFill>
-                  <a:srgbClr val="0033CC"/>
-                </a:solidFill>
-                <a:latin typeface="Trebuchet MS"/>
-              </a:rPr>
-              <a:t>English letters are not as detailed as Kannada fonts. Hence, style transfer currently results in removal of these details.</a:t>
-            </a:r>
-          </a:p>
-          <a:p>
-            <a:pPr marL="342900" indent="-342900">
-              <a:buFont typeface="Arial" panose="020B0604020202020204" pitchFamily="34" charset="0"/>
-              <a:buChar char="•"/>
-            </a:pPr>
-            <a:r>
-              <a:rPr lang="en-US" sz="2400" dirty="0">
-                <a:solidFill>
-                  <a:srgbClr val="0033CC"/>
-                </a:solidFill>
-                <a:latin typeface="Trebuchet MS"/>
-              </a:rPr>
-              <a:t>Creation of large labelled dataset is quite challenging.</a:t>
-            </a:r>
-          </a:p>
-        </p:txBody>
-      </p:sp>
-    </p:spTree>
-    <p:extLst>
-      <p:ext uri="{BB962C8B-B14F-4D97-AF65-F5344CB8AC3E}">
-        <p14:creationId xmlns:p14="http://schemas.microsoft.com/office/powerpoint/2010/main" val="3265279621"/>
       </p:ext>
     </p:extLst>
   </p:cSld>
@@ -10206,41 +10479,13 @@
       </p:grpSpPr>
       <p:sp>
         <p:nvSpPr>
-          <p:cNvPr id="2" name="Rectangle 1"/>
-          <p:cNvSpPr>
-            <a:spLocks noChangeArrowheads="1"/>
-          </p:cNvSpPr>
-          <p:nvPr/>
-        </p:nvSpPr>
-        <p:spPr bwMode="auto">
-          <a:xfrm>
-            <a:off x="3048000" y="1581155"/>
-            <a:ext cx="7620000" cy="36513"/>
-          </a:xfrm>
-          <a:prstGeom prst="rect">
-            <a:avLst/>
-          </a:prstGeom>
-          <a:solidFill>
-            <a:srgbClr val="33CCCC"/>
-          </a:solidFill>
-          <a:ln w="9525">
-            <a:noFill/>
-            <a:miter lim="800000"/>
-            <a:headEnd/>
-            <a:tailEnd/>
-          </a:ln>
-        </p:spPr>
-        <p:txBody>
-          <a:bodyPr wrap="none" anchor="ctr"/>
-          <a:lstStyle/>
-          <a:p>
-            <a:endParaRPr lang="en-US"/>
-          </a:p>
-        </p:txBody>
-      </p:sp>
-      <p:sp>
-        <p:nvSpPr>
-          <p:cNvPr id="3" name="Text Box 34"/>
+          <p:cNvPr id="3" name="Text Box 34">
+            <a:extLst>
+              <a:ext uri="{FF2B5EF4-FFF2-40B4-BE49-F238E27FC236}">
+                <a16:creationId xmlns:a16="http://schemas.microsoft.com/office/drawing/2014/main" id="{D5243A24-7B1E-4FBF-A7A1-F5F47DC0A2EA}"/>
+              </a:ext>
+            </a:extLst>
+          </p:cNvPr>
           <p:cNvSpPr txBox="1">
             <a:spLocks noChangeArrowheads="1"/>
           </p:cNvSpPr>
@@ -10248,8 +10493,8 @@
         </p:nvSpPr>
         <p:spPr bwMode="auto">
           <a:xfrm>
-            <a:off x="2895600" y="1143002"/>
-            <a:ext cx="7772400" cy="461665"/>
+            <a:off x="2895600" y="990600"/>
+            <a:ext cx="7848600" cy="461665"/>
           </a:xfrm>
           <a:prstGeom prst="rect">
             <a:avLst/>
@@ -10286,7 +10531,7 @@
                 <a:cs typeface="Trebuchet MS"/>
                 <a:sym typeface="Trebuchet MS"/>
               </a:rPr>
-              <a:t>Algorithm &amp; Pseudocode</a:t>
+              <a:t>Proposed Approach / Methodology</a:t>
             </a:r>
             <a:endParaRPr lang="en-US" sz="2400" dirty="0"/>
           </a:p>
@@ -10294,722 +10539,594 @@
       </p:sp>
       <p:sp>
         <p:nvSpPr>
-          <p:cNvPr id="8" name="Rectangle 2">
+          <p:cNvPr id="5" name="Content Placeholder 2">
             <a:extLst>
               <a:ext uri="{FF2B5EF4-FFF2-40B4-BE49-F238E27FC236}">
-                <a16:creationId xmlns:a16="http://schemas.microsoft.com/office/drawing/2014/main" id="{89CD6B34-8AF6-4B4A-A290-9ED3C576952B}"/>
+                <a16:creationId xmlns:a16="http://schemas.microsoft.com/office/drawing/2014/main" id="{F2FE3B10-5CE6-477B-8B07-14436C598129}"/>
               </a:ext>
             </a:extLst>
           </p:cNvPr>
-          <p:cNvSpPr>
-            <a:spLocks noChangeArrowheads="1"/>
+          <p:cNvSpPr txBox="1">
+            <a:spLocks/>
           </p:cNvSpPr>
           <p:nvPr/>
         </p:nvSpPr>
-        <p:spPr bwMode="auto">
+        <p:spPr>
           <a:xfrm>
-            <a:off x="1066800" y="1828800"/>
-            <a:ext cx="9850774" cy="4708981"/>
+            <a:off x="800100" y="1676400"/>
+            <a:ext cx="2286000" cy="461666"/>
           </a:xfrm>
           <a:prstGeom prst="rect">
             <a:avLst/>
           </a:prstGeom>
-          <a:noFill/>
-          <a:ln>
-            <a:noFill/>
-          </a:ln>
-          <a:effectLst/>
-          <a:extLst>
-            <a:ext uri="{909E8E84-426E-40DD-AFC4-6F175D3DCCD1}">
-              <a14:hiddenFill xmlns:a14="http://schemas.microsoft.com/office/drawing/2010/main">
-                <a:solidFill>
-                  <a:schemeClr val="accent1"/>
-                </a:solidFill>
-              </a14:hiddenFill>
-            </a:ext>
-            <a:ext uri="{91240B29-F687-4F45-9708-019B960494DF}">
-              <a14:hiddenLine xmlns:a14="http://schemas.microsoft.com/office/drawing/2010/main" w="9525">
-                <a:solidFill>
-                  <a:schemeClr val="tx1"/>
-                </a:solidFill>
-                <a:miter lim="800000"/>
-                <a:headEnd/>
-                <a:tailEnd/>
-              </a14:hiddenLine>
-            </a:ext>
-            <a:ext uri="{AF507438-7753-43E0-B8FC-AC1667EBCBE1}">
-              <a14:hiddenEffects xmlns:a14="http://schemas.microsoft.com/office/drawing/2010/main">
-                <a:effectLst>
-                  <a:outerShdw dist="35921" dir="2700000" algn="ctr" rotWithShape="0">
-                    <a:schemeClr val="bg2"/>
-                  </a:outerShdw>
-                </a:effectLst>
-              </a14:hiddenEffects>
-            </a:ext>
-          </a:extLst>
         </p:spPr>
         <p:txBody>
-          <a:bodyPr vert="horz" wrap="none" lIns="91440" tIns="45720" rIns="91440" bIns="45720" numCol="1" anchor="ctr" anchorCtr="0" compatLnSpc="1">
-            <a:prstTxWarp prst="textNoShape">
-              <a:avLst/>
-            </a:prstTxWarp>
-            <a:spAutoFit/>
-          </a:bodyPr>
-          <a:lstStyle>
-            <a:lvl1pPr eaLnBrk="0" hangingPunct="0">
-              <a:defRPr>
-                <a:solidFill>
-                  <a:schemeClr val="tx1"/>
-                </a:solidFill>
-                <a:latin typeface="Arial" panose="020B0604020202020204" pitchFamily="34" charset="0"/>
-              </a:defRPr>
-            </a:lvl1pPr>
-            <a:lvl2pPr eaLnBrk="0" hangingPunct="0">
-              <a:defRPr>
-                <a:solidFill>
-                  <a:schemeClr val="tx1"/>
-                </a:solidFill>
-                <a:latin typeface="Arial" panose="020B0604020202020204" pitchFamily="34" charset="0"/>
-              </a:defRPr>
-            </a:lvl2pPr>
-            <a:lvl3pPr eaLnBrk="0" hangingPunct="0">
-              <a:defRPr>
-                <a:solidFill>
-                  <a:schemeClr val="tx1"/>
-                </a:solidFill>
-                <a:latin typeface="Arial" panose="020B0604020202020204" pitchFamily="34" charset="0"/>
-              </a:defRPr>
-            </a:lvl3pPr>
-            <a:lvl4pPr eaLnBrk="0" hangingPunct="0">
-              <a:defRPr>
-                <a:solidFill>
-                  <a:schemeClr val="tx1"/>
-                </a:solidFill>
-                <a:latin typeface="Arial" panose="020B0604020202020204" pitchFamily="34" charset="0"/>
-              </a:defRPr>
-            </a:lvl4pPr>
-            <a:lvl5pPr eaLnBrk="0" hangingPunct="0">
-              <a:defRPr>
-                <a:solidFill>
-                  <a:schemeClr val="tx1"/>
-                </a:solidFill>
-                <a:latin typeface="Arial" panose="020B0604020202020204" pitchFamily="34" charset="0"/>
-              </a:defRPr>
-            </a:lvl5pPr>
-            <a:lvl6pPr eaLnBrk="0" fontAlgn="base" hangingPunct="0">
+          <a:bodyPr/>
+          <a:lstStyle/>
+          <a:p>
+            <a:pPr algn="just">
               <a:spcBef>
-                <a:spcPct val="0"/>
+                <a:spcPts val="480"/>
               </a:spcBef>
               <a:spcAft>
-                <a:spcPct val="0"/>
+                <a:spcPts val="0"/>
               </a:spcAft>
-              <a:defRPr>
-                <a:solidFill>
-                  <a:schemeClr val="tx1"/>
-                </a:solidFill>
-                <a:latin typeface="Arial" panose="020B0604020202020204" pitchFamily="34" charset="0"/>
-              </a:defRPr>
-            </a:lvl6pPr>
-            <a:lvl7pPr eaLnBrk="0" fontAlgn="base" hangingPunct="0">
+              <a:buClr>
+                <a:schemeClr val="dk1"/>
+              </a:buClr>
+              <a:buSzPts val="1100"/>
+            </a:pPr>
+            <a:r>
+              <a:rPr lang="en-US" sz="2400" b="1" dirty="0">
+                <a:solidFill>
+                  <a:srgbClr val="0033CC"/>
+                </a:solidFill>
+                <a:latin typeface="Trebuchet MS"/>
+                <a:sym typeface="Trebuchet MS"/>
+              </a:rPr>
+              <a:t>Benefits</a:t>
+            </a:r>
+          </a:p>
+          <a:p>
+            <a:pPr algn="just">
               <a:spcBef>
-                <a:spcPct val="0"/>
+                <a:spcPts val="480"/>
               </a:spcBef>
               <a:spcAft>
-                <a:spcPct val="0"/>
+                <a:spcPts val="0"/>
               </a:spcAft>
-              <a:defRPr>
-                <a:solidFill>
-                  <a:schemeClr val="tx1"/>
-                </a:solidFill>
-                <a:latin typeface="Arial" panose="020B0604020202020204" pitchFamily="34" charset="0"/>
-              </a:defRPr>
-            </a:lvl7pPr>
-            <a:lvl8pPr eaLnBrk="0" fontAlgn="base" hangingPunct="0">
-              <a:spcBef>
-                <a:spcPct val="0"/>
-              </a:spcBef>
-              <a:spcAft>
-                <a:spcPct val="0"/>
-              </a:spcAft>
-              <a:defRPr>
-                <a:solidFill>
-                  <a:schemeClr val="tx1"/>
-                </a:solidFill>
-                <a:latin typeface="Arial" panose="020B0604020202020204" pitchFamily="34" charset="0"/>
-              </a:defRPr>
-            </a:lvl8pPr>
-            <a:lvl9pPr eaLnBrk="0" fontAlgn="base" hangingPunct="0">
-              <a:spcBef>
-                <a:spcPct val="0"/>
-              </a:spcBef>
-              <a:spcAft>
-                <a:spcPct val="0"/>
-              </a:spcAft>
-              <a:defRPr>
-                <a:solidFill>
-                  <a:schemeClr val="tx1"/>
-                </a:solidFill>
-                <a:latin typeface="Arial" panose="020B0604020202020204" pitchFamily="34" charset="0"/>
-              </a:defRPr>
-            </a:lvl9pPr>
-          </a:lstStyle>
-          <a:p>
-            <a:pPr marL="0" marR="0" lvl="0" indent="0" algn="l" defTabSz="914400" rtl="0" eaLnBrk="0" fontAlgn="base" latinLnBrk="0" hangingPunct="0">
-              <a:lnSpc>
-                <a:spcPct val="100000"/>
-              </a:lnSpc>
-              <a:spcBef>
-                <a:spcPct val="0"/>
-              </a:spcBef>
-              <a:spcAft>
-                <a:spcPct val="0"/>
-              </a:spcAft>
-              <a:buClrTx/>
-              <a:buSzTx/>
-              <a:buFontTx/>
-              <a:buNone/>
-              <a:tabLst/>
-            </a:pPr>
-            <a:r>
-              <a:rPr lang="en-US" altLang="en-US" sz="2000" dirty="0" err="1">
-                <a:solidFill>
-                  <a:srgbClr val="0033CC"/>
-                </a:solidFill>
-              </a:rPr>
-              <a:t>input_img</a:t>
-            </a:r>
-            <a:r>
-              <a:rPr lang="en-US" altLang="en-US" sz="2000" dirty="0">
-                <a:solidFill>
-                  <a:srgbClr val="0033CC"/>
-                </a:solidFill>
-              </a:rPr>
-              <a:t> = </a:t>
-            </a:r>
-            <a:r>
-              <a:rPr lang="en-US" altLang="en-US" sz="2000" dirty="0" err="1">
-                <a:solidFill>
-                  <a:srgbClr val="0033CC"/>
-                </a:solidFill>
-              </a:rPr>
-              <a:t>keras.Input</a:t>
-            </a:r>
-            <a:r>
-              <a:rPr lang="en-US" altLang="en-US" sz="2000" dirty="0">
-                <a:solidFill>
-                  <a:srgbClr val="0033CC"/>
-                </a:solidFill>
-              </a:rPr>
-              <a:t>(shape=(DIMS, DIMS, CHANELS))</a:t>
-            </a:r>
-          </a:p>
-          <a:p>
-            <a:pPr marL="0" marR="0" lvl="0" indent="0" algn="l" defTabSz="914400" rtl="0" eaLnBrk="0" fontAlgn="base" latinLnBrk="0" hangingPunct="0">
-              <a:lnSpc>
-                <a:spcPct val="100000"/>
-              </a:lnSpc>
-              <a:spcBef>
-                <a:spcPct val="0"/>
-              </a:spcBef>
-              <a:spcAft>
-                <a:spcPct val="0"/>
-              </a:spcAft>
-              <a:buClrTx/>
-              <a:buSzTx/>
-              <a:buFontTx/>
-              <a:buNone/>
-              <a:tabLst/>
-            </a:pPr>
-            <a:r>
-              <a:rPr lang="en-US" altLang="en-US" sz="2000" dirty="0">
-                <a:solidFill>
-                  <a:srgbClr val="0033CC"/>
-                </a:solidFill>
-              </a:rPr>
-              <a:t>size = </a:t>
-            </a:r>
-            <a:r>
-              <a:rPr lang="en-US" altLang="en-US" sz="2000" dirty="0" err="1">
-                <a:solidFill>
-                  <a:srgbClr val="0033CC"/>
-                </a:solidFill>
-              </a:rPr>
-              <a:t>len</a:t>
-            </a:r>
-            <a:r>
-              <a:rPr lang="en-US" altLang="en-US" sz="2000" dirty="0">
-                <a:solidFill>
-                  <a:srgbClr val="0033CC"/>
-                </a:solidFill>
-              </a:rPr>
-              <a:t>(</a:t>
-            </a:r>
-            <a:r>
-              <a:rPr lang="en-US" altLang="en-US" sz="2000" dirty="0" err="1">
-                <a:solidFill>
-                  <a:srgbClr val="0033CC"/>
-                </a:solidFill>
-              </a:rPr>
-              <a:t>layer_depths</a:t>
-            </a:r>
-            <a:r>
-              <a:rPr lang="en-US" altLang="en-US" sz="2000" dirty="0">
-                <a:solidFill>
-                  <a:srgbClr val="0033CC"/>
-                </a:solidFill>
-              </a:rPr>
-              <a:t>)</a:t>
-            </a:r>
-          </a:p>
-          <a:p>
-            <a:pPr marL="0" marR="0" lvl="0" indent="0" algn="l" defTabSz="914400" rtl="0" eaLnBrk="0" fontAlgn="base" latinLnBrk="0" hangingPunct="0">
-              <a:lnSpc>
-                <a:spcPct val="100000"/>
-              </a:lnSpc>
-              <a:spcBef>
-                <a:spcPct val="0"/>
-              </a:spcBef>
-              <a:spcAft>
-                <a:spcPct val="0"/>
-              </a:spcAft>
-              <a:buClrTx/>
-              <a:buSzTx/>
-              <a:buFontTx/>
-              <a:buNone/>
-              <a:tabLst/>
-            </a:pPr>
-            <a:endParaRPr lang="en-US" altLang="en-US" sz="2000" dirty="0">
+              <a:buClr>
+                <a:schemeClr val="dk1"/>
+              </a:buClr>
+              <a:buSzPts val="1100"/>
+            </a:pPr>
+            <a:endParaRPr lang="en-US" sz="2400" dirty="0">
               <a:solidFill>
                 <a:srgbClr val="0033CC"/>
               </a:solidFill>
+              <a:latin typeface="Trebuchet MS"/>
+              <a:ea typeface="Trebuchet MS"/>
+              <a:cs typeface="Trebuchet MS"/>
+              <a:sym typeface="Trebuchet MS"/>
             </a:endParaRPr>
           </a:p>
-          <a:p>
-            <a:pPr marL="0" marR="0" lvl="0" indent="0" algn="l" defTabSz="914400" rtl="0" eaLnBrk="0" fontAlgn="base" latinLnBrk="0" hangingPunct="0">
-              <a:lnSpc>
-                <a:spcPct val="100000"/>
-              </a:lnSpc>
+        </p:txBody>
+      </p:sp>
+      <p:sp>
+        <p:nvSpPr>
+          <p:cNvPr id="6" name="Rectangle 5">
+            <a:extLst>
+              <a:ext uri="{FF2B5EF4-FFF2-40B4-BE49-F238E27FC236}">
+                <a16:creationId xmlns:a16="http://schemas.microsoft.com/office/drawing/2014/main" id="{29A92C8C-9E14-4F8F-B8DB-F2292094C467}"/>
+              </a:ext>
+            </a:extLst>
+          </p:cNvPr>
+          <p:cNvSpPr/>
+          <p:nvPr/>
+        </p:nvSpPr>
+        <p:spPr>
+          <a:xfrm>
+            <a:off x="800100" y="2138066"/>
+            <a:ext cx="10591800" cy="1569660"/>
+          </a:xfrm>
+          <a:prstGeom prst="rect">
+            <a:avLst/>
+          </a:prstGeom>
+        </p:spPr>
+        <p:txBody>
+          <a:bodyPr wrap="square">
+            <a:spAutoFit/>
+          </a:bodyPr>
+          <a:lstStyle/>
+          <a:p>
+            <a:pPr marL="342900" indent="-342900">
+              <a:buFont typeface="Arial" panose="020B0604020202020204" pitchFamily="34" charset="0"/>
+              <a:buChar char="•"/>
+            </a:pPr>
+            <a:r>
+              <a:rPr lang="en-US" sz="2400" dirty="0">
+                <a:solidFill>
+                  <a:srgbClr val="0033CC"/>
+                </a:solidFill>
+                <a:latin typeface="Trebuchet MS"/>
+              </a:rPr>
+              <a:t>Just a </a:t>
+            </a:r>
+            <a:r>
+              <a:rPr lang="en-US" sz="2400" b="1" dirty="0">
+                <a:solidFill>
+                  <a:srgbClr val="0033CC"/>
+                </a:solidFill>
+                <a:latin typeface="Trebuchet MS"/>
+              </a:rPr>
+              <a:t>single trained autoencoder </a:t>
+            </a:r>
+            <a:r>
+              <a:rPr lang="en-US" sz="2400" dirty="0">
+                <a:solidFill>
+                  <a:srgbClr val="0033CC"/>
+                </a:solidFill>
+                <a:latin typeface="Trebuchet MS"/>
+              </a:rPr>
+              <a:t>can be used to </a:t>
+            </a:r>
+            <a:r>
+              <a:rPr lang="en-US" sz="2400" b="1" dirty="0">
+                <a:solidFill>
+                  <a:srgbClr val="0033CC"/>
+                </a:solidFill>
+                <a:latin typeface="Trebuchet MS"/>
+              </a:rPr>
+              <a:t>generate fonts </a:t>
+            </a:r>
+            <a:r>
+              <a:rPr lang="en-US" sz="2400" dirty="0">
+                <a:solidFill>
+                  <a:srgbClr val="0033CC"/>
+                </a:solidFill>
+                <a:latin typeface="Trebuchet MS"/>
+              </a:rPr>
+              <a:t>for </a:t>
+            </a:r>
+            <a:r>
+              <a:rPr lang="en-US" sz="2400" b="1" dirty="0">
+                <a:solidFill>
+                  <a:srgbClr val="0033CC"/>
+                </a:solidFill>
+                <a:latin typeface="Trebuchet MS"/>
+              </a:rPr>
+              <a:t>every character</a:t>
+            </a:r>
+            <a:r>
+              <a:rPr lang="en-US" sz="2400" dirty="0">
+                <a:solidFill>
+                  <a:srgbClr val="0033CC"/>
+                </a:solidFill>
+                <a:latin typeface="Trebuchet MS"/>
+              </a:rPr>
+              <a:t> of </a:t>
+            </a:r>
+            <a:r>
+              <a:rPr lang="en-US" sz="2400" b="1" dirty="0">
+                <a:solidFill>
+                  <a:srgbClr val="0033CC"/>
+                </a:solidFill>
+                <a:latin typeface="Trebuchet MS"/>
+              </a:rPr>
+              <a:t>Kannada or any language</a:t>
+            </a:r>
+            <a:r>
+              <a:rPr lang="en-US" sz="2400" dirty="0">
+                <a:solidFill>
+                  <a:srgbClr val="0033CC"/>
+                </a:solidFill>
+                <a:latin typeface="Trebuchet MS"/>
+              </a:rPr>
+              <a:t>. </a:t>
+            </a:r>
+          </a:p>
+          <a:p>
+            <a:pPr marL="342900" indent="-342900">
+              <a:buFont typeface="Arial" panose="020B0604020202020204" pitchFamily="34" charset="0"/>
+              <a:buChar char="•"/>
+            </a:pPr>
+            <a:r>
+              <a:rPr lang="en-US" sz="2400" b="1" dirty="0">
+                <a:solidFill>
+                  <a:srgbClr val="0033CC"/>
+                </a:solidFill>
+                <a:latin typeface="Trebuchet MS"/>
+              </a:rPr>
+              <a:t>Models</a:t>
+            </a:r>
+            <a:r>
+              <a:rPr lang="en-US" sz="2400" dirty="0">
+                <a:solidFill>
+                  <a:srgbClr val="0033CC"/>
+                </a:solidFill>
+                <a:latin typeface="Trebuchet MS"/>
+              </a:rPr>
+              <a:t> are comparatively </a:t>
+            </a:r>
+            <a:r>
+              <a:rPr lang="en-US" sz="2400" b="1" dirty="0">
+                <a:solidFill>
+                  <a:srgbClr val="0033CC"/>
+                </a:solidFill>
+                <a:latin typeface="Trebuchet MS"/>
+              </a:rPr>
+              <a:t>smaller</a:t>
+            </a:r>
+            <a:r>
+              <a:rPr lang="en-US" sz="2400" dirty="0">
+                <a:solidFill>
+                  <a:srgbClr val="0033CC"/>
+                </a:solidFill>
+                <a:latin typeface="Trebuchet MS"/>
+              </a:rPr>
+              <a:t>.</a:t>
+            </a:r>
+          </a:p>
+          <a:p>
+            <a:pPr marL="342900" indent="-342900">
+              <a:buFont typeface="Arial" panose="020B0604020202020204" pitchFamily="34" charset="0"/>
+              <a:buChar char="•"/>
+            </a:pPr>
+            <a:r>
+              <a:rPr lang="en-US" sz="2400" b="1" dirty="0">
+                <a:solidFill>
+                  <a:srgbClr val="0033CC"/>
+                </a:solidFill>
+                <a:latin typeface="Trebuchet MS"/>
+              </a:rPr>
+              <a:t>Generation</a:t>
+            </a:r>
+            <a:r>
+              <a:rPr lang="en-US" sz="2400" dirty="0">
+                <a:solidFill>
+                  <a:srgbClr val="0033CC"/>
+                </a:solidFill>
+                <a:latin typeface="Trebuchet MS"/>
+              </a:rPr>
+              <a:t> is very </a:t>
+            </a:r>
+            <a:r>
+              <a:rPr lang="en-US" sz="2400" b="1" dirty="0">
+                <a:solidFill>
+                  <a:srgbClr val="0033CC"/>
+                </a:solidFill>
+                <a:latin typeface="Trebuchet MS"/>
+              </a:rPr>
+              <a:t>quick</a:t>
+            </a:r>
+            <a:r>
+              <a:rPr lang="en-US" sz="2400" dirty="0">
+                <a:solidFill>
+                  <a:srgbClr val="0033CC"/>
+                </a:solidFill>
+                <a:latin typeface="Trebuchet MS"/>
+              </a:rPr>
+              <a:t>.</a:t>
+            </a:r>
+          </a:p>
+        </p:txBody>
+      </p:sp>
+      <p:sp>
+        <p:nvSpPr>
+          <p:cNvPr id="7" name="Content Placeholder 2">
+            <a:extLst>
+              <a:ext uri="{FF2B5EF4-FFF2-40B4-BE49-F238E27FC236}">
+                <a16:creationId xmlns:a16="http://schemas.microsoft.com/office/drawing/2014/main" id="{A89DFB97-3C3A-4847-B7C5-95B8C6707D08}"/>
+              </a:ext>
+            </a:extLst>
+          </p:cNvPr>
+          <p:cNvSpPr txBox="1">
+            <a:spLocks/>
+          </p:cNvSpPr>
+          <p:nvPr/>
+        </p:nvSpPr>
+        <p:spPr>
+          <a:xfrm>
+            <a:off x="800100" y="3938559"/>
+            <a:ext cx="2286000" cy="461666"/>
+          </a:xfrm>
+          <a:prstGeom prst="rect">
+            <a:avLst/>
+          </a:prstGeom>
+        </p:spPr>
+        <p:txBody>
+          <a:bodyPr/>
+          <a:lstStyle/>
+          <a:p>
+            <a:pPr algn="just">
               <a:spcBef>
-                <a:spcPct val="0"/>
+                <a:spcPts val="480"/>
               </a:spcBef>
               <a:spcAft>
-                <a:spcPct val="0"/>
+                <a:spcPts val="0"/>
               </a:spcAft>
-              <a:buClrTx/>
-              <a:buSzTx/>
-              <a:buFontTx/>
-              <a:buNone/>
-              <a:tabLst/>
-            </a:pPr>
-            <a:r>
-              <a:rPr lang="en-US" altLang="en-US" sz="2000" dirty="0">
-                <a:solidFill>
-                  <a:srgbClr val="0033CC"/>
-                </a:solidFill>
-              </a:rPr>
-              <a:t>x = layers.Conv2D(8, (9, 9), activation='</a:t>
-            </a:r>
-            <a:r>
-              <a:rPr lang="en-US" altLang="en-US" sz="2000" dirty="0" err="1">
-                <a:solidFill>
-                  <a:srgbClr val="0033CC"/>
-                </a:solidFill>
-              </a:rPr>
-              <a:t>relu</a:t>
-            </a:r>
-            <a:r>
-              <a:rPr lang="en-US" altLang="en-US" sz="2000" dirty="0">
-                <a:solidFill>
-                  <a:srgbClr val="0033CC"/>
-                </a:solidFill>
-              </a:rPr>
-              <a:t>', padding='same')(</a:t>
-            </a:r>
-            <a:r>
-              <a:rPr lang="en-US" altLang="en-US" sz="2000" dirty="0" err="1">
-                <a:solidFill>
-                  <a:srgbClr val="0033CC"/>
-                </a:solidFill>
-              </a:rPr>
-              <a:t>input_img</a:t>
-            </a:r>
-            <a:r>
-              <a:rPr lang="en-US" altLang="en-US" sz="2000" dirty="0">
-                <a:solidFill>
-                  <a:srgbClr val="0033CC"/>
-                </a:solidFill>
-              </a:rPr>
-              <a:t>)</a:t>
-            </a:r>
-          </a:p>
-          <a:p>
-            <a:pPr marL="0" marR="0" lvl="0" indent="0" algn="l" defTabSz="914400" rtl="0" eaLnBrk="0" fontAlgn="base" latinLnBrk="0" hangingPunct="0">
-              <a:lnSpc>
-                <a:spcPct val="100000"/>
-              </a:lnSpc>
+              <a:buClr>
+                <a:schemeClr val="dk1"/>
+              </a:buClr>
+              <a:buSzPts val="1100"/>
+            </a:pPr>
+            <a:r>
+              <a:rPr lang="en-US" sz="2400" b="1" dirty="0">
+                <a:solidFill>
+                  <a:srgbClr val="0033CC"/>
+                </a:solidFill>
+                <a:latin typeface="Trebuchet MS"/>
+                <a:sym typeface="Trebuchet MS"/>
+              </a:rPr>
+              <a:t>Drawbacks</a:t>
+            </a:r>
+          </a:p>
+          <a:p>
+            <a:pPr algn="just">
               <a:spcBef>
-                <a:spcPct val="0"/>
+                <a:spcPts val="480"/>
               </a:spcBef>
               <a:spcAft>
-                <a:spcPct val="0"/>
+                <a:spcPts val="0"/>
               </a:spcAft>
-              <a:buClrTx/>
-              <a:buSzTx/>
-              <a:buFontTx/>
-              <a:buNone/>
-              <a:tabLst/>
-            </a:pPr>
-            <a:r>
-              <a:rPr lang="en-US" altLang="en-US" sz="2000" dirty="0">
-                <a:solidFill>
-                  <a:srgbClr val="0033CC"/>
-                </a:solidFill>
-              </a:rPr>
-              <a:t>x = layers.MaxPooling2D((2, 2), padding='same')(x)</a:t>
-            </a:r>
-          </a:p>
-          <a:p>
-            <a:pPr marL="0" marR="0" lvl="0" indent="0" algn="l" defTabSz="914400" rtl="0" eaLnBrk="0" fontAlgn="base" latinLnBrk="0" hangingPunct="0">
-              <a:lnSpc>
-                <a:spcPct val="100000"/>
-              </a:lnSpc>
-              <a:spcBef>
-                <a:spcPct val="0"/>
-              </a:spcBef>
-              <a:spcAft>
-                <a:spcPct val="0"/>
-              </a:spcAft>
-              <a:buClrTx/>
-              <a:buSzTx/>
-              <a:buFontTx/>
-              <a:buNone/>
-              <a:tabLst/>
-            </a:pPr>
-            <a:r>
-              <a:rPr lang="en-US" altLang="en-US" sz="2000" dirty="0">
-                <a:solidFill>
-                  <a:srgbClr val="0033CC"/>
-                </a:solidFill>
-              </a:rPr>
-              <a:t>x = layers.Conv2D(8, (9, 9), activation='</a:t>
-            </a:r>
-            <a:r>
-              <a:rPr lang="en-US" altLang="en-US" sz="2000" dirty="0" err="1">
-                <a:solidFill>
-                  <a:srgbClr val="0033CC"/>
-                </a:solidFill>
-              </a:rPr>
-              <a:t>relu</a:t>
-            </a:r>
-            <a:r>
-              <a:rPr lang="en-US" altLang="en-US" sz="2000" dirty="0">
-                <a:solidFill>
-                  <a:srgbClr val="0033CC"/>
-                </a:solidFill>
-              </a:rPr>
-              <a:t>', padding='same')(</a:t>
-            </a:r>
-            <a:r>
-              <a:rPr lang="en-US" altLang="en-US" sz="2000" dirty="0" err="1">
-                <a:solidFill>
-                  <a:srgbClr val="0033CC"/>
-                </a:solidFill>
-              </a:rPr>
-              <a:t>input_img</a:t>
-            </a:r>
-            <a:r>
-              <a:rPr lang="en-US" altLang="en-US" sz="2000" dirty="0">
-                <a:solidFill>
-                  <a:srgbClr val="0033CC"/>
-                </a:solidFill>
-              </a:rPr>
-              <a:t>)</a:t>
-            </a:r>
-          </a:p>
-          <a:p>
-            <a:pPr marL="0" marR="0" lvl="0" indent="0" defTabSz="914400" eaLnBrk="0" latinLnBrk="0" hangingPunct="0">
-              <a:lnSpc>
-                <a:spcPct val="100000"/>
-              </a:lnSpc>
-              <a:buClrTx/>
-              <a:buSzTx/>
-              <a:buFontTx/>
-              <a:buNone/>
-              <a:tabLst/>
-            </a:pPr>
-            <a:r>
-              <a:rPr lang="en-US" altLang="en-US" sz="2000" dirty="0">
-                <a:solidFill>
-                  <a:srgbClr val="0033CC"/>
-                </a:solidFill>
-              </a:rPr>
-              <a:t>encoded = layers.MaxPooling2D((2, 2), padding='same')(x)</a:t>
-            </a:r>
-          </a:p>
-          <a:p>
-            <a:pPr marL="0" marR="0" lvl="0" indent="0" defTabSz="914400" eaLnBrk="0" latinLnBrk="0" hangingPunct="0">
-              <a:lnSpc>
-                <a:spcPct val="100000"/>
-              </a:lnSpc>
-              <a:buClrTx/>
-              <a:buSzTx/>
-              <a:buFontTx/>
-              <a:buNone/>
-              <a:tabLst/>
-            </a:pPr>
-            <a:endParaRPr lang="en-US" altLang="en-US" sz="2000" dirty="0">
+              <a:buClr>
+                <a:schemeClr val="dk1"/>
+              </a:buClr>
+              <a:buSzPts val="1100"/>
+            </a:pPr>
+            <a:endParaRPr lang="en-US" sz="2400" dirty="0">
               <a:solidFill>
                 <a:srgbClr val="0033CC"/>
               </a:solidFill>
+              <a:latin typeface="Trebuchet MS"/>
+              <a:ea typeface="Trebuchet MS"/>
+              <a:cs typeface="Trebuchet MS"/>
+              <a:sym typeface="Trebuchet MS"/>
             </a:endParaRPr>
           </a:p>
-          <a:p>
-            <a:pPr marL="0" marR="0" lvl="0" indent="0" defTabSz="914400" eaLnBrk="0" latinLnBrk="0" hangingPunct="0">
-              <a:lnSpc>
-                <a:spcPct val="100000"/>
-              </a:lnSpc>
-              <a:buClrTx/>
-              <a:buSzTx/>
-              <a:buFontTx/>
-              <a:buNone/>
-              <a:tabLst/>
-            </a:pPr>
-            <a:r>
-              <a:rPr lang="en-US" altLang="en-US" sz="2000" dirty="0">
-                <a:solidFill>
-                  <a:srgbClr val="0033CC"/>
-                </a:solidFill>
-              </a:rPr>
-              <a:t>x = layers.Conv2D(8, (9, 9), activation='</a:t>
-            </a:r>
-            <a:r>
-              <a:rPr lang="en-US" altLang="en-US" sz="2000" dirty="0" err="1">
-                <a:solidFill>
-                  <a:srgbClr val="0033CC"/>
-                </a:solidFill>
-              </a:rPr>
-              <a:t>relu</a:t>
-            </a:r>
-            <a:r>
-              <a:rPr lang="en-US" altLang="en-US" sz="2000" dirty="0">
-                <a:solidFill>
-                  <a:srgbClr val="0033CC"/>
-                </a:solidFill>
-              </a:rPr>
-              <a:t>', padding='same')(encoded)</a:t>
-            </a:r>
-          </a:p>
-          <a:p>
-            <a:pPr marL="0" marR="0" lvl="0" indent="0" defTabSz="914400" eaLnBrk="0" latinLnBrk="0" hangingPunct="0">
-              <a:lnSpc>
-                <a:spcPct val="100000"/>
-              </a:lnSpc>
-              <a:buClrTx/>
-              <a:buSzTx/>
-              <a:buFontTx/>
-              <a:buNone/>
-              <a:tabLst/>
-            </a:pPr>
-            <a:r>
-              <a:rPr lang="en-US" altLang="en-US" sz="2000" dirty="0">
-                <a:solidFill>
-                  <a:srgbClr val="0033CC"/>
-                </a:solidFill>
-              </a:rPr>
-              <a:t>x = layers.UpSampling2D((2, 2))(x)</a:t>
-            </a:r>
-          </a:p>
-          <a:p>
-            <a:pPr marL="0" marR="0" lvl="0" indent="0" defTabSz="914400" eaLnBrk="0" latinLnBrk="0" hangingPunct="0">
-              <a:lnSpc>
-                <a:spcPct val="100000"/>
-              </a:lnSpc>
-              <a:buClrTx/>
-              <a:buSzTx/>
-              <a:buFontTx/>
-              <a:buNone/>
-              <a:tabLst/>
-            </a:pPr>
-            <a:r>
-              <a:rPr lang="en-US" altLang="en-US" sz="2000" dirty="0">
-                <a:solidFill>
-                  <a:srgbClr val="0033CC"/>
-                </a:solidFill>
-              </a:rPr>
-              <a:t>x = layers.Conv2D(8, (9, 9), activation='</a:t>
-            </a:r>
-            <a:r>
-              <a:rPr lang="en-US" altLang="en-US" sz="2000" dirty="0" err="1">
-                <a:solidFill>
-                  <a:srgbClr val="0033CC"/>
-                </a:solidFill>
-              </a:rPr>
-              <a:t>relu</a:t>
-            </a:r>
-            <a:r>
-              <a:rPr lang="en-US" altLang="en-US" sz="2000" dirty="0">
-                <a:solidFill>
-                  <a:srgbClr val="0033CC"/>
-                </a:solidFill>
-              </a:rPr>
-              <a:t>', padding='same')(encoded)</a:t>
-            </a:r>
-          </a:p>
-          <a:p>
-            <a:pPr marL="0" marR="0" lvl="0" indent="0" defTabSz="914400" eaLnBrk="0" latinLnBrk="0" hangingPunct="0">
-              <a:lnSpc>
-                <a:spcPct val="100000"/>
-              </a:lnSpc>
-              <a:buClrTx/>
-              <a:buSzTx/>
-              <a:buFontTx/>
-              <a:buNone/>
-              <a:tabLst/>
-            </a:pPr>
-            <a:r>
-              <a:rPr lang="en-US" altLang="en-US" sz="2000" dirty="0">
-                <a:solidFill>
-                  <a:srgbClr val="0033CC"/>
-                </a:solidFill>
-              </a:rPr>
-              <a:t>x = layers.UpSampling2D((2, 2))(x)</a:t>
-            </a:r>
-          </a:p>
-          <a:p>
-            <a:pPr marL="0" marR="0" lvl="0" indent="0" defTabSz="914400" eaLnBrk="0" latinLnBrk="0" hangingPunct="0">
-              <a:lnSpc>
-                <a:spcPct val="100000"/>
-              </a:lnSpc>
-              <a:buClrTx/>
-              <a:buSzTx/>
-              <a:buFontTx/>
-              <a:buNone/>
-              <a:tabLst/>
-            </a:pPr>
-            <a:r>
-              <a:rPr lang="en-US" altLang="en-US" sz="2000" dirty="0">
-                <a:solidFill>
-                  <a:srgbClr val="0033CC"/>
-                </a:solidFill>
-              </a:rPr>
-              <a:t>decoded = layers.Conv2D(CHANELS, (7, 7), activation='sigmoid', padding='same')(x)</a:t>
-            </a:r>
-          </a:p>
-          <a:p>
-            <a:pPr marL="0" marR="0" lvl="0" indent="0" defTabSz="914400" eaLnBrk="0" latinLnBrk="0" hangingPunct="0">
-              <a:lnSpc>
-                <a:spcPct val="100000"/>
-              </a:lnSpc>
-              <a:buClrTx/>
-              <a:buSzTx/>
-              <a:buFontTx/>
-              <a:buNone/>
-              <a:tabLst/>
-            </a:pPr>
-            <a:r>
-              <a:rPr lang="en-US" altLang="en-US" sz="2000" dirty="0">
-                <a:solidFill>
-                  <a:srgbClr val="0033CC"/>
-                </a:solidFill>
-              </a:rPr>
-              <a:t>autoencoder = </a:t>
-            </a:r>
-            <a:r>
-              <a:rPr lang="en-US" altLang="en-US" sz="2000" dirty="0" err="1">
-                <a:solidFill>
-                  <a:srgbClr val="0033CC"/>
-                </a:solidFill>
-              </a:rPr>
-              <a:t>keras.Model</a:t>
-            </a:r>
-            <a:r>
-              <a:rPr lang="en-US" altLang="en-US" sz="2000" dirty="0">
-                <a:solidFill>
-                  <a:srgbClr val="0033CC"/>
-                </a:solidFill>
-              </a:rPr>
-              <a:t>(</a:t>
-            </a:r>
-            <a:r>
-              <a:rPr lang="en-US" altLang="en-US" sz="2000" dirty="0" err="1">
-                <a:solidFill>
-                  <a:srgbClr val="0033CC"/>
-                </a:solidFill>
-              </a:rPr>
-              <a:t>input_img</a:t>
-            </a:r>
-            <a:r>
-              <a:rPr lang="en-US" altLang="en-US" sz="2000" dirty="0">
-                <a:solidFill>
-                  <a:srgbClr val="0033CC"/>
-                </a:solidFill>
-              </a:rPr>
-              <a:t>, decoded)</a:t>
-            </a:r>
-          </a:p>
-          <a:p>
-            <a:pPr marL="0" marR="0" lvl="0" indent="0" defTabSz="914400" eaLnBrk="0" latinLnBrk="0" hangingPunct="0">
-              <a:lnSpc>
-                <a:spcPct val="100000"/>
-              </a:lnSpc>
-              <a:buClrTx/>
-              <a:buSzTx/>
-              <a:buFontTx/>
-              <a:buNone/>
-              <a:tabLst/>
-            </a:pPr>
-            <a:r>
-              <a:rPr lang="en-US" altLang="en-US" sz="2000" dirty="0" err="1">
-                <a:solidFill>
-                  <a:srgbClr val="0033CC"/>
-                </a:solidFill>
-              </a:rPr>
-              <a:t>autoencoder.compile</a:t>
-            </a:r>
-            <a:r>
-              <a:rPr lang="en-US" altLang="en-US" sz="2000" dirty="0">
-                <a:solidFill>
-                  <a:srgbClr val="0033CC"/>
-                </a:solidFill>
-              </a:rPr>
-              <a:t>(optimizer='</a:t>
-            </a:r>
-            <a:r>
-              <a:rPr lang="en-US" altLang="en-US" sz="2000" dirty="0" err="1">
-                <a:solidFill>
-                  <a:srgbClr val="0033CC"/>
-                </a:solidFill>
-              </a:rPr>
-              <a:t>adam</a:t>
-            </a:r>
-            <a:r>
-              <a:rPr lang="en-US" altLang="en-US" sz="2000" dirty="0">
-                <a:solidFill>
-                  <a:srgbClr val="0033CC"/>
-                </a:solidFill>
-              </a:rPr>
-              <a:t>', loss='</a:t>
-            </a:r>
-            <a:r>
-              <a:rPr lang="en-US" altLang="en-US" sz="2000" dirty="0" err="1">
-                <a:solidFill>
-                  <a:srgbClr val="0033CC"/>
-                </a:solidFill>
-              </a:rPr>
-              <a:t>binary_crossentropy</a:t>
-            </a:r>
-            <a:r>
-              <a:rPr lang="en-US" altLang="en-US" sz="2000" dirty="0">
-                <a:solidFill>
-                  <a:srgbClr val="0033CC"/>
-                </a:solidFill>
-              </a:rPr>
-              <a:t>')</a:t>
-            </a:r>
-          </a:p>
         </p:txBody>
       </p:sp>
+      <p:sp>
+        <p:nvSpPr>
+          <p:cNvPr id="9" name="Rectangle 8">
+            <a:extLst>
+              <a:ext uri="{FF2B5EF4-FFF2-40B4-BE49-F238E27FC236}">
+                <a16:creationId xmlns:a16="http://schemas.microsoft.com/office/drawing/2014/main" id="{230474D7-32EA-4263-9CBB-E2803FFE4DA6}"/>
+              </a:ext>
+            </a:extLst>
+          </p:cNvPr>
+          <p:cNvSpPr/>
+          <p:nvPr/>
+        </p:nvSpPr>
+        <p:spPr>
+          <a:xfrm>
+            <a:off x="833230" y="4400225"/>
+            <a:ext cx="10591800" cy="1569660"/>
+          </a:xfrm>
+          <a:prstGeom prst="rect">
+            <a:avLst/>
+          </a:prstGeom>
+        </p:spPr>
+        <p:txBody>
+          <a:bodyPr wrap="square">
+            <a:spAutoFit/>
+          </a:bodyPr>
+          <a:lstStyle/>
+          <a:p>
+            <a:pPr marL="342900" indent="-342900">
+              <a:buFont typeface="Arial" panose="020B0604020202020204" pitchFamily="34" charset="0"/>
+              <a:buChar char="•"/>
+            </a:pPr>
+            <a:r>
+              <a:rPr lang="en-US" sz="2400" b="1" dirty="0">
+                <a:solidFill>
+                  <a:srgbClr val="0033CC"/>
+                </a:solidFill>
+                <a:latin typeface="Trebuchet MS"/>
+              </a:rPr>
+              <a:t>New model </a:t>
+            </a:r>
+            <a:r>
+              <a:rPr lang="en-US" sz="2400" dirty="0">
+                <a:solidFill>
+                  <a:srgbClr val="0033CC"/>
+                </a:solidFill>
+                <a:latin typeface="Trebuchet MS"/>
+              </a:rPr>
+              <a:t>is </a:t>
+            </a:r>
+            <a:r>
+              <a:rPr lang="en-US" sz="2400" b="1" dirty="0">
+                <a:solidFill>
+                  <a:srgbClr val="0033CC"/>
+                </a:solidFill>
+                <a:latin typeface="Trebuchet MS"/>
+              </a:rPr>
+              <a:t>required</a:t>
+            </a:r>
+            <a:r>
+              <a:rPr lang="en-US" sz="2400" dirty="0">
+                <a:solidFill>
+                  <a:srgbClr val="0033CC"/>
+                </a:solidFill>
+                <a:latin typeface="Trebuchet MS"/>
+              </a:rPr>
+              <a:t> for </a:t>
+            </a:r>
+            <a:r>
+              <a:rPr lang="en-US" sz="2400" b="1" dirty="0">
+                <a:solidFill>
+                  <a:srgbClr val="0033CC"/>
+                </a:solidFill>
+                <a:latin typeface="Trebuchet MS"/>
+              </a:rPr>
+              <a:t>each font</a:t>
+            </a:r>
+            <a:r>
+              <a:rPr lang="en-US" sz="2400" dirty="0">
+                <a:solidFill>
+                  <a:srgbClr val="0033CC"/>
+                </a:solidFill>
+                <a:latin typeface="Trebuchet MS"/>
+              </a:rPr>
+              <a:t>.</a:t>
+            </a:r>
+          </a:p>
+          <a:p>
+            <a:pPr marL="342900" indent="-342900">
+              <a:buFont typeface="Arial" panose="020B0604020202020204" pitchFamily="34" charset="0"/>
+              <a:buChar char="•"/>
+            </a:pPr>
+            <a:r>
+              <a:rPr lang="en-US" sz="2400" b="1" dirty="0">
+                <a:solidFill>
+                  <a:srgbClr val="0033CC"/>
+                </a:solidFill>
+                <a:latin typeface="Trebuchet MS"/>
+              </a:rPr>
+              <a:t>English</a:t>
+            </a:r>
+            <a:r>
+              <a:rPr lang="en-US" sz="2400" dirty="0">
+                <a:solidFill>
+                  <a:srgbClr val="0033CC"/>
+                </a:solidFill>
+                <a:latin typeface="Trebuchet MS"/>
+              </a:rPr>
+              <a:t> </a:t>
+            </a:r>
+            <a:r>
+              <a:rPr lang="en-US" sz="2400" b="1" dirty="0">
+                <a:solidFill>
+                  <a:srgbClr val="0033CC"/>
+                </a:solidFill>
+                <a:latin typeface="Trebuchet MS"/>
+              </a:rPr>
+              <a:t>letters</a:t>
+            </a:r>
+            <a:r>
+              <a:rPr lang="en-US" sz="2400" dirty="0">
+                <a:solidFill>
+                  <a:srgbClr val="0033CC"/>
+                </a:solidFill>
+                <a:latin typeface="Trebuchet MS"/>
+              </a:rPr>
+              <a:t> are </a:t>
+            </a:r>
+            <a:r>
+              <a:rPr lang="en-US" sz="2400" b="1" dirty="0">
+                <a:solidFill>
+                  <a:srgbClr val="0033CC"/>
+                </a:solidFill>
+                <a:latin typeface="Trebuchet MS"/>
+              </a:rPr>
+              <a:t>not</a:t>
+            </a:r>
+            <a:r>
+              <a:rPr lang="en-US" sz="2400" dirty="0">
+                <a:solidFill>
+                  <a:srgbClr val="0033CC"/>
+                </a:solidFill>
+                <a:latin typeface="Trebuchet MS"/>
+              </a:rPr>
+              <a:t> as </a:t>
+            </a:r>
+            <a:r>
+              <a:rPr lang="en-US" sz="2400" b="1" dirty="0">
+                <a:solidFill>
+                  <a:srgbClr val="0033CC"/>
+                </a:solidFill>
+                <a:latin typeface="Trebuchet MS"/>
+              </a:rPr>
+              <a:t>detailed as Kannada fonts</a:t>
+            </a:r>
+            <a:r>
+              <a:rPr lang="en-US" sz="2400" dirty="0">
+                <a:solidFill>
+                  <a:srgbClr val="0033CC"/>
+                </a:solidFill>
+                <a:latin typeface="Trebuchet MS"/>
+              </a:rPr>
+              <a:t>. Hence, style transfer currently results in </a:t>
+            </a:r>
+            <a:r>
+              <a:rPr lang="en-US" sz="2400" b="1" dirty="0">
+                <a:solidFill>
+                  <a:srgbClr val="0033CC"/>
+                </a:solidFill>
+                <a:latin typeface="Trebuchet MS"/>
+              </a:rPr>
+              <a:t>removal</a:t>
+            </a:r>
+            <a:r>
+              <a:rPr lang="en-US" sz="2400" dirty="0">
+                <a:solidFill>
+                  <a:srgbClr val="0033CC"/>
+                </a:solidFill>
+                <a:latin typeface="Trebuchet MS"/>
+              </a:rPr>
+              <a:t> of these </a:t>
+            </a:r>
+            <a:r>
+              <a:rPr lang="en-US" sz="2400" b="1" dirty="0">
+                <a:solidFill>
+                  <a:srgbClr val="0033CC"/>
+                </a:solidFill>
+                <a:latin typeface="Trebuchet MS"/>
+              </a:rPr>
+              <a:t>intricate details</a:t>
+            </a:r>
+            <a:r>
+              <a:rPr lang="en-US" sz="2400" dirty="0">
+                <a:solidFill>
+                  <a:srgbClr val="0033CC"/>
+                </a:solidFill>
+                <a:latin typeface="Trebuchet MS"/>
+              </a:rPr>
+              <a:t>.</a:t>
+            </a:r>
+          </a:p>
+          <a:p>
+            <a:pPr marL="342900" indent="-342900">
+              <a:buFont typeface="Arial" panose="020B0604020202020204" pitchFamily="34" charset="0"/>
+              <a:buChar char="•"/>
+            </a:pPr>
+            <a:r>
+              <a:rPr lang="en-US" sz="2400" dirty="0">
+                <a:solidFill>
+                  <a:srgbClr val="0033CC"/>
+                </a:solidFill>
+                <a:latin typeface="Trebuchet MS"/>
+              </a:rPr>
+              <a:t>Creation of </a:t>
+            </a:r>
+            <a:r>
+              <a:rPr lang="en-US" sz="2400" b="1" dirty="0">
+                <a:solidFill>
+                  <a:srgbClr val="0033CC"/>
+                </a:solidFill>
+                <a:latin typeface="Trebuchet MS"/>
+              </a:rPr>
+              <a:t>large labelled </a:t>
+            </a:r>
+            <a:r>
+              <a:rPr lang="en-US" sz="2400" dirty="0">
+                <a:solidFill>
+                  <a:srgbClr val="0033CC"/>
+                </a:solidFill>
+                <a:latin typeface="Trebuchet MS"/>
+              </a:rPr>
+              <a:t>dataset is quite challenging.</a:t>
+            </a:r>
+          </a:p>
+        </p:txBody>
+      </p:sp>
     </p:spTree>
+    <p:extLst>
+      <p:ext uri="{BB962C8B-B14F-4D97-AF65-F5344CB8AC3E}">
+        <p14:creationId xmlns:p14="http://schemas.microsoft.com/office/powerpoint/2010/main" val="3265279621"/>
+      </p:ext>
+    </p:extLst>
   </p:cSld>
   <p:clrMapOvr>
     <a:masterClrMapping/>
@@ -12057,8 +12174,8 @@
         </p:nvSpPr>
         <p:spPr>
           <a:xfrm>
-            <a:off x="1066800" y="2084311"/>
-            <a:ext cx="8839199" cy="3046988"/>
+            <a:off x="990600" y="2362200"/>
+            <a:ext cx="9601200" cy="2677656"/>
           </a:xfrm>
           <a:prstGeom prst="rect">
             <a:avLst/>
@@ -12091,7 +12208,7 @@
                 <a:cs typeface="Trebuchet MS"/>
                 <a:sym typeface="Trebuchet MS"/>
               </a:rPr>
-              <a:t>The two approaches pursued provide decent results for English language. </a:t>
+              <a:t>The required datasets have been obtained, cleaned and labelled. </a:t>
             </a:r>
           </a:p>
           <a:p>
@@ -12115,7 +12232,7 @@
                 <a:cs typeface="Trebuchet MS"/>
                 <a:sym typeface="Trebuchet MS"/>
               </a:rPr>
-              <a:t>However, have not successfully captured all the intricated details of the Kannada language.</a:t>
+              <a:t>A basic model has been trained using two approaches – Neural Style Transfer and Autoencoders. </a:t>
             </a:r>
           </a:p>
           <a:p>
@@ -12139,7 +12256,7 @@
                 <a:cs typeface="Trebuchet MS"/>
                 <a:sym typeface="Trebuchet MS"/>
               </a:rPr>
-              <a:t>Figuring out a loss function to capture the font styles is crucial for further enhancement of the obtained results.</a:t>
+              <a:t>This has provided us with decent results for English language. </a:t>
             </a:r>
           </a:p>
           <a:p>
@@ -12163,7 +12280,31 @@
                 <a:cs typeface="Trebuchet MS"/>
                 <a:sym typeface="Trebuchet MS"/>
               </a:rPr>
-              <a:t>We plan to develop our own loss function and test them to achieve the expected results.</a:t>
+              <a:t>Style transfer has been achieved to the basic extent.</a:t>
+            </a:r>
+          </a:p>
+          <a:p>
+            <a:pPr marL="342900" lvl="0" indent="-342900" algn="just">
+              <a:spcBef>
+                <a:spcPts val="0"/>
+              </a:spcBef>
+              <a:spcAft>
+                <a:spcPts val="0"/>
+              </a:spcAft>
+              <a:buFont typeface="Arial" panose="020B0604020202020204" pitchFamily="34" charset="0"/>
+              <a:buChar char="•"/>
+            </a:pPr>
+            <a:r>
+              <a:rPr lang="en-US" sz="2400" dirty="0">
+                <a:solidFill>
+                  <a:srgbClr val="0033CC"/>
+                </a:solidFill>
+                <a:latin typeface="Trebuchet MS"/>
+                <a:ea typeface="Trebuchet MS"/>
+                <a:cs typeface="Trebuchet MS"/>
+                <a:sym typeface="Trebuchet MS"/>
+              </a:rPr>
+              <a:t>We intend to further capture all the intricate details of the Kannada language and enhance the results.</a:t>
             </a:r>
           </a:p>
         </p:txBody>
@@ -15868,10 +16009,10 @@
       </p:sp>
       <p:grpSp>
         <p:nvGrpSpPr>
-          <p:cNvPr id="2" name="Group 1">
+          <p:cNvPr id="3" name="Group 2">
             <a:extLst>
               <a:ext uri="{FF2B5EF4-FFF2-40B4-BE49-F238E27FC236}">
-                <a16:creationId xmlns:a16="http://schemas.microsoft.com/office/drawing/2014/main" id="{3A5F10FB-AD43-4D1B-BC4B-D1C02AF46B6C}"/>
+                <a16:creationId xmlns:a16="http://schemas.microsoft.com/office/drawing/2014/main" id="{64A75A61-9916-421E-8811-3626EC3E1127}"/>
               </a:ext>
             </a:extLst>
           </p:cNvPr>
@@ -16040,7 +16181,7 @@
           </p:blipFill>
           <p:spPr>
             <a:xfrm>
-              <a:off x="3695699" y="3343321"/>
+              <a:off x="3511267" y="3343321"/>
               <a:ext cx="6528135" cy="1716088"/>
             </a:xfrm>
             <a:prstGeom prst="rect">

</xml_diff>